<commit_message>
Final updated version of presentation.
</commit_message>
<xml_diff>
--- a/report/Shared Stack Implementation and Analysis Using Queue Delegation.pptx
+++ b/report/Shared Stack Implementation and Analysis Using Queue Delegation.pptx
@@ -7,18 +7,20 @@
   <p:sldIdLst>
     <p:sldId id="256" r:id="rId2"/>
     <p:sldId id="257" r:id="rId3"/>
-    <p:sldId id="258" r:id="rId4"/>
-    <p:sldId id="259" r:id="rId5"/>
-    <p:sldId id="262" r:id="rId6"/>
-    <p:sldId id="260" r:id="rId7"/>
-    <p:sldId id="261" r:id="rId8"/>
-    <p:sldId id="263" r:id="rId9"/>
-    <p:sldId id="264" r:id="rId10"/>
-    <p:sldId id="265" r:id="rId11"/>
-    <p:sldId id="266" r:id="rId12"/>
-    <p:sldId id="267" r:id="rId13"/>
-    <p:sldId id="268" r:id="rId14"/>
-    <p:sldId id="269" r:id="rId15"/>
+    <p:sldId id="270" r:id="rId4"/>
+    <p:sldId id="258" r:id="rId5"/>
+    <p:sldId id="259" r:id="rId6"/>
+    <p:sldId id="262" r:id="rId7"/>
+    <p:sldId id="260" r:id="rId8"/>
+    <p:sldId id="271" r:id="rId9"/>
+    <p:sldId id="261" r:id="rId10"/>
+    <p:sldId id="263" r:id="rId11"/>
+    <p:sldId id="264" r:id="rId12"/>
+    <p:sldId id="265" r:id="rId13"/>
+    <p:sldId id="266" r:id="rId14"/>
+    <p:sldId id="267" r:id="rId15"/>
+    <p:sldId id="268" r:id="rId16"/>
+    <p:sldId id="269" r:id="rId17"/>
   </p:sldIdLst>
   <p:sldSz cx="12192000" cy="6858000"/>
   <p:notesSz cx="6858000" cy="9144000"/>
@@ -251,7 +253,7 @@
           <a:p>
             <a:fld id="{34A4A8E0-5BB8-4F0D-9100-AA57B54B0DFB}" type="datetimeFigureOut">
               <a:rPr lang="en-US" smtClean="0"/>
-              <a:t>11/18/2014</a:t>
+              <a:t>11/25/2014</a:t>
             </a:fld>
             <a:endParaRPr lang="en-US"/>
           </a:p>
@@ -421,7 +423,7 @@
           <a:p>
             <a:fld id="{34A4A8E0-5BB8-4F0D-9100-AA57B54B0DFB}" type="datetimeFigureOut">
               <a:rPr lang="en-US" smtClean="0"/>
-              <a:t>11/18/2014</a:t>
+              <a:t>11/25/2014</a:t>
             </a:fld>
             <a:endParaRPr lang="en-US"/>
           </a:p>
@@ -601,7 +603,7 @@
           <a:p>
             <a:fld id="{34A4A8E0-5BB8-4F0D-9100-AA57B54B0DFB}" type="datetimeFigureOut">
               <a:rPr lang="en-US" smtClean="0"/>
-              <a:t>11/18/2014</a:t>
+              <a:t>11/25/2014</a:t>
             </a:fld>
             <a:endParaRPr lang="en-US"/>
           </a:p>
@@ -771,7 +773,7 @@
           <a:p>
             <a:fld id="{34A4A8E0-5BB8-4F0D-9100-AA57B54B0DFB}" type="datetimeFigureOut">
               <a:rPr lang="en-US" smtClean="0"/>
-              <a:t>11/18/2014</a:t>
+              <a:t>11/25/2014</a:t>
             </a:fld>
             <a:endParaRPr lang="en-US"/>
           </a:p>
@@ -1017,7 +1019,7 @@
           <a:p>
             <a:fld id="{34A4A8E0-5BB8-4F0D-9100-AA57B54B0DFB}" type="datetimeFigureOut">
               <a:rPr lang="en-US" smtClean="0"/>
-              <a:t>11/18/2014</a:t>
+              <a:t>11/25/2014</a:t>
             </a:fld>
             <a:endParaRPr lang="en-US"/>
           </a:p>
@@ -1249,7 +1251,7 @@
           <a:p>
             <a:fld id="{34A4A8E0-5BB8-4F0D-9100-AA57B54B0DFB}" type="datetimeFigureOut">
               <a:rPr lang="en-US" smtClean="0"/>
-              <a:t>11/18/2014</a:t>
+              <a:t>11/25/2014</a:t>
             </a:fld>
             <a:endParaRPr lang="en-US"/>
           </a:p>
@@ -1616,7 +1618,7 @@
           <a:p>
             <a:fld id="{34A4A8E0-5BB8-4F0D-9100-AA57B54B0DFB}" type="datetimeFigureOut">
               <a:rPr lang="en-US" smtClean="0"/>
-              <a:t>11/18/2014</a:t>
+              <a:t>11/25/2014</a:t>
             </a:fld>
             <a:endParaRPr lang="en-US"/>
           </a:p>
@@ -1734,7 +1736,7 @@
           <a:p>
             <a:fld id="{34A4A8E0-5BB8-4F0D-9100-AA57B54B0DFB}" type="datetimeFigureOut">
               <a:rPr lang="en-US" smtClean="0"/>
-              <a:t>11/18/2014</a:t>
+              <a:t>11/25/2014</a:t>
             </a:fld>
             <a:endParaRPr lang="en-US"/>
           </a:p>
@@ -1829,7 +1831,7 @@
           <a:p>
             <a:fld id="{34A4A8E0-5BB8-4F0D-9100-AA57B54B0DFB}" type="datetimeFigureOut">
               <a:rPr lang="en-US" smtClean="0"/>
-              <a:t>11/18/2014</a:t>
+              <a:t>11/25/2014</a:t>
             </a:fld>
             <a:endParaRPr lang="en-US"/>
           </a:p>
@@ -2106,7 +2108,7 @@
           <a:p>
             <a:fld id="{34A4A8E0-5BB8-4F0D-9100-AA57B54B0DFB}" type="datetimeFigureOut">
               <a:rPr lang="en-US" smtClean="0"/>
-              <a:t>11/18/2014</a:t>
+              <a:t>11/25/2014</a:t>
             </a:fld>
             <a:endParaRPr lang="en-US"/>
           </a:p>
@@ -2359,7 +2361,7 @@
           <a:p>
             <a:fld id="{34A4A8E0-5BB8-4F0D-9100-AA57B54B0DFB}" type="datetimeFigureOut">
               <a:rPr lang="en-US" smtClean="0"/>
-              <a:t>11/18/2014</a:t>
+              <a:t>11/25/2014</a:t>
             </a:fld>
             <a:endParaRPr lang="en-US"/>
           </a:p>
@@ -2572,7 +2574,7 @@
           <a:p>
             <a:fld id="{34A4A8E0-5BB8-4F0D-9100-AA57B54B0DFB}" type="datetimeFigureOut">
               <a:rPr lang="en-US" smtClean="0"/>
-              <a:t>11/18/2014</a:t>
+              <a:t>11/25/2014</a:t>
             </a:fld>
             <a:endParaRPr lang="en-US"/>
           </a:p>
@@ -3074,6 +3076,160 @@
       </p:grpSpPr>
       <p:sp>
         <p:nvSpPr>
+          <p:cNvPr id="2" name="Title 1"/>
+          <p:cNvSpPr>
+            <a:spLocks noGrp="1"/>
+          </p:cNvSpPr>
+          <p:nvPr>
+            <p:ph type="title"/>
+          </p:nvPr>
+        </p:nvSpPr>
+        <p:spPr/>
+        <p:txBody>
+          <a:bodyPr/>
+          <a:lstStyle/>
+          <a:p>
+            <a:r>
+              <a:rPr lang="en-US" dirty="0" smtClean="0"/>
+              <a:t>Results</a:t>
+            </a:r>
+            <a:endParaRPr lang="en-US" dirty="0"/>
+          </a:p>
+        </p:txBody>
+      </p:sp>
+      <p:pic>
+        <p:nvPicPr>
+          <p:cNvPr id="4" name="Picture 3"/>
+          <p:cNvPicPr>
+            <a:picLocks noChangeAspect="1"/>
+          </p:cNvPicPr>
+          <p:nvPr/>
+        </p:nvPicPr>
+        <p:blipFill>
+          <a:blip r:embed="rId2"/>
+          <a:stretch>
+            <a:fillRect/>
+          </a:stretch>
+        </p:blipFill>
+        <p:spPr>
+          <a:xfrm>
+            <a:off x="1632195" y="1690688"/>
+            <a:ext cx="8619388" cy="4871372"/>
+          </a:xfrm>
+          <a:prstGeom prst="rect">
+            <a:avLst/>
+          </a:prstGeom>
+        </p:spPr>
+      </p:pic>
+    </p:spTree>
+    <p:extLst>
+      <p:ext uri="{BB962C8B-B14F-4D97-AF65-F5344CB8AC3E}">
+        <p14:creationId xmlns:p14="http://schemas.microsoft.com/office/powerpoint/2010/main" val="1044984339"/>
+      </p:ext>
+    </p:extLst>
+  </p:cSld>
+  <p:clrMapOvr>
+    <a:masterClrMapping/>
+  </p:clrMapOvr>
+</p:sld>
+</file>
+
+<file path=ppt/slides/slide11.xml><?xml version="1.0" encoding="utf-8"?>
+<p:sld xmlns:a="http://schemas.openxmlformats.org/drawingml/2006/main" xmlns:r="http://schemas.openxmlformats.org/officeDocument/2006/relationships" xmlns:p="http://schemas.openxmlformats.org/presentationml/2006/main">
+  <p:cSld>
+    <p:spTree>
+      <p:nvGrpSpPr>
+        <p:cNvPr id="1" name=""/>
+        <p:cNvGrpSpPr/>
+        <p:nvPr/>
+      </p:nvGrpSpPr>
+      <p:grpSpPr>
+        <a:xfrm>
+          <a:off x="0" y="0"/>
+          <a:ext cx="0" cy="0"/>
+          <a:chOff x="0" y="0"/>
+          <a:chExt cx="0" cy="0"/>
+        </a:xfrm>
+      </p:grpSpPr>
+      <p:sp>
+        <p:nvSpPr>
+          <p:cNvPr id="2" name="Title 1"/>
+          <p:cNvSpPr>
+            <a:spLocks noGrp="1"/>
+          </p:cNvSpPr>
+          <p:nvPr>
+            <p:ph type="title"/>
+          </p:nvPr>
+        </p:nvSpPr>
+        <p:spPr/>
+        <p:txBody>
+          <a:bodyPr/>
+          <a:lstStyle/>
+          <a:p>
+            <a:r>
+              <a:rPr lang="en-US" dirty="0" smtClean="0"/>
+              <a:t>Results</a:t>
+            </a:r>
+            <a:endParaRPr lang="en-US" dirty="0"/>
+          </a:p>
+        </p:txBody>
+      </p:sp>
+      <p:pic>
+        <p:nvPicPr>
+          <p:cNvPr id="4" name="Picture 3"/>
+          <p:cNvPicPr>
+            <a:picLocks noChangeAspect="1"/>
+          </p:cNvPicPr>
+          <p:nvPr/>
+        </p:nvPicPr>
+        <p:blipFill>
+          <a:blip r:embed="rId2"/>
+          <a:stretch>
+            <a:fillRect/>
+          </a:stretch>
+        </p:blipFill>
+        <p:spPr>
+          <a:xfrm>
+            <a:off x="2095332" y="1320743"/>
+            <a:ext cx="8001336" cy="5537257"/>
+          </a:xfrm>
+          <a:prstGeom prst="rect">
+            <a:avLst/>
+          </a:prstGeom>
+        </p:spPr>
+      </p:pic>
+    </p:spTree>
+    <p:extLst>
+      <p:ext uri="{BB962C8B-B14F-4D97-AF65-F5344CB8AC3E}">
+        <p14:creationId xmlns:p14="http://schemas.microsoft.com/office/powerpoint/2010/main" val="3482677248"/>
+      </p:ext>
+    </p:extLst>
+  </p:cSld>
+  <p:clrMapOvr>
+    <a:masterClrMapping/>
+  </p:clrMapOvr>
+</p:sld>
+</file>
+
+<file path=ppt/slides/slide12.xml><?xml version="1.0" encoding="utf-8"?>
+<p:sld xmlns:a="http://schemas.openxmlformats.org/drawingml/2006/main" xmlns:r="http://schemas.openxmlformats.org/officeDocument/2006/relationships" xmlns:p="http://schemas.openxmlformats.org/presentationml/2006/main">
+  <p:cSld>
+    <p:spTree>
+      <p:nvGrpSpPr>
+        <p:cNvPr id="1" name=""/>
+        <p:cNvGrpSpPr/>
+        <p:nvPr/>
+      </p:nvGrpSpPr>
+      <p:grpSpPr>
+        <a:xfrm>
+          <a:off x="0" y="0"/>
+          <a:ext cx="0" cy="0"/>
+          <a:chOff x="0" y="0"/>
+          <a:chExt cx="0" cy="0"/>
+        </a:xfrm>
+      </p:grpSpPr>
+      <p:sp>
+        <p:nvSpPr>
           <p:cNvPr id="3" name="Title 1"/>
           <p:cNvSpPr>
             <a:spLocks noGrp="1"/>
@@ -3132,7 +3288,7 @@
 </p:sld>
 </file>
 
-<file path=ppt/slides/slide11.xml><?xml version="1.0" encoding="utf-8"?>
+<file path=ppt/slides/slide13.xml><?xml version="1.0" encoding="utf-8"?>
 <p:sld xmlns:a="http://schemas.openxmlformats.org/drawingml/2006/main" xmlns:r="http://schemas.openxmlformats.org/officeDocument/2006/relationships" xmlns:p="http://schemas.openxmlformats.org/presentationml/2006/main">
   <p:cSld>
     <p:spTree>
@@ -3209,7 +3365,7 @@
 </p:sld>
 </file>
 
-<file path=ppt/slides/slide12.xml><?xml version="1.0" encoding="utf-8"?>
+<file path=ppt/slides/slide14.xml><?xml version="1.0" encoding="utf-8"?>
 <p:sld xmlns:a="http://schemas.openxmlformats.org/drawingml/2006/main" xmlns:r="http://schemas.openxmlformats.org/officeDocument/2006/relationships" xmlns:p="http://schemas.openxmlformats.org/presentationml/2006/main">
   <p:cSld>
     <p:spTree>
@@ -3286,7 +3442,7 @@
 </p:sld>
 </file>
 
-<file path=ppt/slides/slide13.xml><?xml version="1.0" encoding="utf-8"?>
+<file path=ppt/slides/slide15.xml><?xml version="1.0" encoding="utf-8"?>
 <p:sld xmlns:a="http://schemas.openxmlformats.org/drawingml/2006/main" xmlns:r="http://schemas.openxmlformats.org/officeDocument/2006/relationships" xmlns:p="http://schemas.openxmlformats.org/presentationml/2006/main">
   <p:cSld>
     <p:spTree>
@@ -3465,7 +3621,7 @@
 </p:sld>
 </file>
 
-<file path=ppt/slides/slide14.xml><?xml version="1.0" encoding="utf-8"?>
+<file path=ppt/slides/slide16.xml><?xml version="1.0" encoding="utf-8"?>
 <p:sld xmlns:a="http://schemas.openxmlformats.org/drawingml/2006/main" xmlns:r="http://schemas.openxmlformats.org/officeDocument/2006/relationships" xmlns:p="http://schemas.openxmlformats.org/presentationml/2006/main">
   <p:cSld>
     <p:spTree>
@@ -3697,113 +3853,893 @@
       </p:sp>
       <p:sp>
         <p:nvSpPr>
-          <p:cNvPr id="3" name="Content Placeholder 2"/>
-          <p:cNvSpPr>
-            <a:spLocks noGrp="1"/>
-          </p:cNvSpPr>
-          <p:nvPr>
-            <p:ph idx="1"/>
-          </p:nvPr>
-        </p:nvSpPr>
-        <p:spPr/>
-        <p:txBody>
-          <a:bodyPr>
-            <a:normAutofit lnSpcReduction="10000"/>
+          <p:cNvPr id="5" name="Rectangle 4"/>
+          <p:cNvSpPr/>
+          <p:nvPr/>
+        </p:nvSpPr>
+        <p:spPr>
+          <a:xfrm>
+            <a:off x="1500753" y="2645691"/>
+            <a:ext cx="1317356" cy="1015139"/>
+          </a:xfrm>
+          <a:prstGeom prst="rect">
+            <a:avLst/>
+          </a:prstGeom>
+        </p:spPr>
+        <p:style>
+          <a:lnRef idx="2">
+            <a:schemeClr val="accent1">
+              <a:shade val="50000"/>
+            </a:schemeClr>
+          </a:lnRef>
+          <a:fillRef idx="1">
+            <a:schemeClr val="accent1"/>
+          </a:fillRef>
+          <a:effectRef idx="0">
+            <a:schemeClr val="accent1"/>
+          </a:effectRef>
+          <a:fontRef idx="minor">
+            <a:schemeClr val="lt1"/>
+          </a:fontRef>
+        </p:style>
+        <p:txBody>
+          <a:bodyPr rtlCol="0" anchor="ctr"/>
+          <a:lstStyle/>
+          <a:p>
+            <a:pPr algn="ctr"/>
+            <a:endParaRPr lang="en-US"/>
+          </a:p>
+        </p:txBody>
+      </p:sp>
+      <p:sp>
+        <p:nvSpPr>
+          <p:cNvPr id="6" name="Rectangle 5"/>
+          <p:cNvSpPr/>
+          <p:nvPr/>
+        </p:nvSpPr>
+        <p:spPr>
+          <a:xfrm>
+            <a:off x="1653153" y="2798091"/>
+            <a:ext cx="1317356" cy="1015139"/>
+          </a:xfrm>
+          <a:prstGeom prst="rect">
+            <a:avLst/>
+          </a:prstGeom>
+        </p:spPr>
+        <p:style>
+          <a:lnRef idx="2">
+            <a:schemeClr val="accent1">
+              <a:shade val="50000"/>
+            </a:schemeClr>
+          </a:lnRef>
+          <a:fillRef idx="1">
+            <a:schemeClr val="accent1"/>
+          </a:fillRef>
+          <a:effectRef idx="0">
+            <a:schemeClr val="accent1"/>
+          </a:effectRef>
+          <a:fontRef idx="minor">
+            <a:schemeClr val="lt1"/>
+          </a:fontRef>
+        </p:style>
+        <p:txBody>
+          <a:bodyPr rtlCol="0" anchor="ctr"/>
+          <a:lstStyle/>
+          <a:p>
+            <a:pPr algn="ctr"/>
+            <a:endParaRPr lang="en-US"/>
+          </a:p>
+        </p:txBody>
+      </p:sp>
+      <p:sp>
+        <p:nvSpPr>
+          <p:cNvPr id="7" name="Rectangle 6"/>
+          <p:cNvSpPr/>
+          <p:nvPr/>
+        </p:nvSpPr>
+        <p:spPr>
+          <a:xfrm>
+            <a:off x="1805553" y="2950491"/>
+            <a:ext cx="1317356" cy="1015139"/>
+          </a:xfrm>
+          <a:prstGeom prst="rect">
+            <a:avLst/>
+          </a:prstGeom>
+        </p:spPr>
+        <p:style>
+          <a:lnRef idx="2">
+            <a:schemeClr val="accent1">
+              <a:shade val="50000"/>
+            </a:schemeClr>
+          </a:lnRef>
+          <a:fillRef idx="1">
+            <a:schemeClr val="accent1"/>
+          </a:fillRef>
+          <a:effectRef idx="0">
+            <a:schemeClr val="accent1"/>
+          </a:effectRef>
+          <a:fontRef idx="minor">
+            <a:schemeClr val="lt1"/>
+          </a:fontRef>
+        </p:style>
+        <p:txBody>
+          <a:bodyPr rtlCol="0" anchor="ctr"/>
+          <a:lstStyle/>
+          <a:p>
+            <a:pPr algn="ctr"/>
+            <a:endParaRPr lang="en-US"/>
+          </a:p>
+        </p:txBody>
+      </p:sp>
+      <p:sp>
+        <p:nvSpPr>
+          <p:cNvPr id="8" name="Rectangle 7"/>
+          <p:cNvSpPr/>
+          <p:nvPr/>
+        </p:nvSpPr>
+        <p:spPr>
+          <a:xfrm>
+            <a:off x="1957953" y="3102891"/>
+            <a:ext cx="1317356" cy="1015139"/>
+          </a:xfrm>
+          <a:prstGeom prst="rect">
+            <a:avLst/>
+          </a:prstGeom>
+        </p:spPr>
+        <p:style>
+          <a:lnRef idx="2">
+            <a:schemeClr val="accent1">
+              <a:shade val="50000"/>
+            </a:schemeClr>
+          </a:lnRef>
+          <a:fillRef idx="1">
+            <a:schemeClr val="accent1"/>
+          </a:fillRef>
+          <a:effectRef idx="0">
+            <a:schemeClr val="accent1"/>
+          </a:effectRef>
+          <a:fontRef idx="minor">
+            <a:schemeClr val="lt1"/>
+          </a:fontRef>
+        </p:style>
+        <p:txBody>
+          <a:bodyPr rtlCol="0" anchor="ctr"/>
+          <a:lstStyle/>
+          <a:p>
+            <a:pPr algn="ctr"/>
+            <a:r>
+              <a:rPr lang="en-US" dirty="0" smtClean="0"/>
+              <a:t>Worker</a:t>
+            </a:r>
+          </a:p>
+          <a:p>
+            <a:pPr algn="ctr"/>
+            <a:r>
+              <a:rPr lang="en-US" dirty="0" smtClean="0"/>
+              <a:t>Threads</a:t>
+            </a:r>
+            <a:endParaRPr lang="en-US" dirty="0"/>
+          </a:p>
+        </p:txBody>
+      </p:sp>
+      <p:grpSp>
+        <p:nvGrpSpPr>
+          <p:cNvPr id="16" name="Group 15"/>
+          <p:cNvGrpSpPr/>
+          <p:nvPr/>
+        </p:nvGrpSpPr>
+        <p:grpSpPr>
+          <a:xfrm>
+            <a:off x="4174211" y="3051875"/>
+            <a:ext cx="1446502" cy="507570"/>
+            <a:chOff x="4287866" y="3459996"/>
+            <a:chExt cx="1446502" cy="507570"/>
+          </a:xfrm>
+        </p:grpSpPr>
+        <p:sp>
+          <p:nvSpPr>
+            <p:cNvPr id="9" name="Rectangle 8"/>
+            <p:cNvSpPr/>
+            <p:nvPr/>
+          </p:nvSpPr>
+          <p:spPr>
+            <a:xfrm>
+              <a:off x="4287866" y="3459996"/>
+              <a:ext cx="206644" cy="507570"/>
+            </a:xfrm>
+            <a:prstGeom prst="rect">
+              <a:avLst/>
+            </a:prstGeom>
+            <a:noFill/>
+          </p:spPr>
+          <p:style>
+            <a:lnRef idx="2">
+              <a:schemeClr val="accent1">
+                <a:shade val="50000"/>
+              </a:schemeClr>
+            </a:lnRef>
+            <a:fillRef idx="1">
+              <a:schemeClr val="accent1"/>
+            </a:fillRef>
+            <a:effectRef idx="0">
+              <a:schemeClr val="accent1"/>
+            </a:effectRef>
+            <a:fontRef idx="minor">
+              <a:schemeClr val="lt1"/>
+            </a:fontRef>
+          </p:style>
+          <p:txBody>
+            <a:bodyPr rtlCol="0" anchor="ctr"/>
+            <a:lstStyle/>
+            <a:p>
+              <a:pPr algn="ctr"/>
+              <a:endParaRPr lang="en-US"/>
+            </a:p>
+          </p:txBody>
+        </p:sp>
+        <p:sp>
+          <p:nvSpPr>
+            <p:cNvPr id="10" name="Rectangle 9"/>
+            <p:cNvSpPr/>
+            <p:nvPr/>
+          </p:nvSpPr>
+          <p:spPr>
+            <a:xfrm>
+              <a:off x="4494509" y="3459996"/>
+              <a:ext cx="206644" cy="507570"/>
+            </a:xfrm>
+            <a:prstGeom prst="rect">
+              <a:avLst/>
+            </a:prstGeom>
+            <a:noFill/>
+          </p:spPr>
+          <p:style>
+            <a:lnRef idx="2">
+              <a:schemeClr val="accent1">
+                <a:shade val="50000"/>
+              </a:schemeClr>
+            </a:lnRef>
+            <a:fillRef idx="1">
+              <a:schemeClr val="accent1"/>
+            </a:fillRef>
+            <a:effectRef idx="0">
+              <a:schemeClr val="accent1"/>
+            </a:effectRef>
+            <a:fontRef idx="minor">
+              <a:schemeClr val="lt1"/>
+            </a:fontRef>
+          </p:style>
+          <p:txBody>
+            <a:bodyPr rtlCol="0" anchor="ctr"/>
+            <a:lstStyle/>
+            <a:p>
+              <a:pPr algn="ctr"/>
+              <a:endParaRPr lang="en-US"/>
+            </a:p>
+          </p:txBody>
+        </p:sp>
+        <p:sp>
+          <p:nvSpPr>
+            <p:cNvPr id="11" name="Rectangle 10"/>
+            <p:cNvSpPr/>
+            <p:nvPr/>
+          </p:nvSpPr>
+          <p:spPr>
+            <a:xfrm>
+              <a:off x="4701152" y="3459996"/>
+              <a:ext cx="206644" cy="507570"/>
+            </a:xfrm>
+            <a:prstGeom prst="rect">
+              <a:avLst/>
+            </a:prstGeom>
+            <a:noFill/>
+          </p:spPr>
+          <p:style>
+            <a:lnRef idx="2">
+              <a:schemeClr val="accent1">
+                <a:shade val="50000"/>
+              </a:schemeClr>
+            </a:lnRef>
+            <a:fillRef idx="1">
+              <a:schemeClr val="accent1"/>
+            </a:fillRef>
+            <a:effectRef idx="0">
+              <a:schemeClr val="accent1"/>
+            </a:effectRef>
+            <a:fontRef idx="minor">
+              <a:schemeClr val="lt1"/>
+            </a:fontRef>
+          </p:style>
+          <p:txBody>
+            <a:bodyPr rtlCol="0" anchor="ctr"/>
+            <a:lstStyle/>
+            <a:p>
+              <a:pPr algn="ctr"/>
+              <a:endParaRPr lang="en-US"/>
+            </a:p>
+          </p:txBody>
+        </p:sp>
+        <p:sp>
+          <p:nvSpPr>
+            <p:cNvPr id="12" name="Rectangle 11"/>
+            <p:cNvSpPr/>
+            <p:nvPr/>
+          </p:nvSpPr>
+          <p:spPr>
+            <a:xfrm>
+              <a:off x="4907795" y="3459996"/>
+              <a:ext cx="206644" cy="507570"/>
+            </a:xfrm>
+            <a:prstGeom prst="rect">
+              <a:avLst/>
+            </a:prstGeom>
+            <a:noFill/>
+          </p:spPr>
+          <p:style>
+            <a:lnRef idx="2">
+              <a:schemeClr val="accent1">
+                <a:shade val="50000"/>
+              </a:schemeClr>
+            </a:lnRef>
+            <a:fillRef idx="1">
+              <a:schemeClr val="accent1"/>
+            </a:fillRef>
+            <a:effectRef idx="0">
+              <a:schemeClr val="accent1"/>
+            </a:effectRef>
+            <a:fontRef idx="minor">
+              <a:schemeClr val="lt1"/>
+            </a:fontRef>
+          </p:style>
+          <p:txBody>
+            <a:bodyPr rtlCol="0" anchor="ctr"/>
+            <a:lstStyle/>
+            <a:p>
+              <a:pPr algn="ctr"/>
+              <a:endParaRPr lang="en-US"/>
+            </a:p>
+          </p:txBody>
+        </p:sp>
+        <p:sp>
+          <p:nvSpPr>
+            <p:cNvPr id="13" name="Rectangle 12"/>
+            <p:cNvSpPr/>
+            <p:nvPr/>
+          </p:nvSpPr>
+          <p:spPr>
+            <a:xfrm>
+              <a:off x="5114438" y="3459996"/>
+              <a:ext cx="206644" cy="507570"/>
+            </a:xfrm>
+            <a:prstGeom prst="rect">
+              <a:avLst/>
+            </a:prstGeom>
+            <a:noFill/>
+          </p:spPr>
+          <p:style>
+            <a:lnRef idx="2">
+              <a:schemeClr val="accent1">
+                <a:shade val="50000"/>
+              </a:schemeClr>
+            </a:lnRef>
+            <a:fillRef idx="1">
+              <a:schemeClr val="accent1"/>
+            </a:fillRef>
+            <a:effectRef idx="0">
+              <a:schemeClr val="accent1"/>
+            </a:effectRef>
+            <a:fontRef idx="minor">
+              <a:schemeClr val="lt1"/>
+            </a:fontRef>
+          </p:style>
+          <p:txBody>
+            <a:bodyPr rtlCol="0" anchor="ctr"/>
+            <a:lstStyle/>
+            <a:p>
+              <a:pPr algn="ctr"/>
+              <a:endParaRPr lang="en-US"/>
+            </a:p>
+          </p:txBody>
+        </p:sp>
+        <p:sp>
+          <p:nvSpPr>
+            <p:cNvPr id="14" name="Rectangle 13"/>
+            <p:cNvSpPr/>
+            <p:nvPr/>
+          </p:nvSpPr>
+          <p:spPr>
+            <a:xfrm>
+              <a:off x="5321081" y="3459996"/>
+              <a:ext cx="206644" cy="507570"/>
+            </a:xfrm>
+            <a:prstGeom prst="rect">
+              <a:avLst/>
+            </a:prstGeom>
+            <a:noFill/>
+          </p:spPr>
+          <p:style>
+            <a:lnRef idx="2">
+              <a:schemeClr val="accent1">
+                <a:shade val="50000"/>
+              </a:schemeClr>
+            </a:lnRef>
+            <a:fillRef idx="1">
+              <a:schemeClr val="accent1"/>
+            </a:fillRef>
+            <a:effectRef idx="0">
+              <a:schemeClr val="accent1"/>
+            </a:effectRef>
+            <a:fontRef idx="minor">
+              <a:schemeClr val="lt1"/>
+            </a:fontRef>
+          </p:style>
+          <p:txBody>
+            <a:bodyPr rtlCol="0" anchor="ctr"/>
+            <a:lstStyle/>
+            <a:p>
+              <a:pPr algn="ctr"/>
+              <a:endParaRPr lang="en-US"/>
+            </a:p>
+          </p:txBody>
+        </p:sp>
+        <p:sp>
+          <p:nvSpPr>
+            <p:cNvPr id="15" name="Rectangle 14"/>
+            <p:cNvSpPr/>
+            <p:nvPr/>
+          </p:nvSpPr>
+          <p:spPr>
+            <a:xfrm>
+              <a:off x="5527724" y="3459996"/>
+              <a:ext cx="206644" cy="507570"/>
+            </a:xfrm>
+            <a:prstGeom prst="rect">
+              <a:avLst/>
+            </a:prstGeom>
+            <a:noFill/>
+          </p:spPr>
+          <p:style>
+            <a:lnRef idx="2">
+              <a:schemeClr val="accent1">
+                <a:shade val="50000"/>
+              </a:schemeClr>
+            </a:lnRef>
+            <a:fillRef idx="1">
+              <a:schemeClr val="accent1"/>
+            </a:fillRef>
+            <a:effectRef idx="0">
+              <a:schemeClr val="accent1"/>
+            </a:effectRef>
+            <a:fontRef idx="minor">
+              <a:schemeClr val="lt1"/>
+            </a:fontRef>
+          </p:style>
+          <p:txBody>
+            <a:bodyPr rtlCol="0" anchor="ctr"/>
+            <a:lstStyle/>
+            <a:p>
+              <a:pPr algn="ctr"/>
+              <a:endParaRPr lang="en-US"/>
+            </a:p>
+          </p:txBody>
+        </p:sp>
+      </p:grpSp>
+      <p:sp>
+        <p:nvSpPr>
+          <p:cNvPr id="17" name="Rectangle 16"/>
+          <p:cNvSpPr/>
+          <p:nvPr/>
+        </p:nvSpPr>
+        <p:spPr>
+          <a:xfrm>
+            <a:off x="6527370" y="2798091"/>
+            <a:ext cx="1317356" cy="1015139"/>
+          </a:xfrm>
+          <a:prstGeom prst="rect">
+            <a:avLst/>
+          </a:prstGeom>
+        </p:spPr>
+        <p:style>
+          <a:lnRef idx="2">
+            <a:schemeClr val="accent1">
+              <a:shade val="50000"/>
+            </a:schemeClr>
+          </a:lnRef>
+          <a:fillRef idx="1">
+            <a:schemeClr val="accent1"/>
+          </a:fillRef>
+          <a:effectRef idx="0">
+            <a:schemeClr val="accent1"/>
+          </a:effectRef>
+          <a:fontRef idx="minor">
+            <a:schemeClr val="lt1"/>
+          </a:fontRef>
+        </p:style>
+        <p:txBody>
+          <a:bodyPr rtlCol="0" anchor="ctr"/>
+          <a:lstStyle/>
+          <a:p>
+            <a:pPr algn="ctr"/>
+            <a:r>
+              <a:rPr lang="en-US" dirty="0" smtClean="0"/>
+              <a:t>Delegate</a:t>
+            </a:r>
+          </a:p>
+          <a:p>
+            <a:pPr algn="ctr"/>
+            <a:r>
+              <a:rPr lang="en-US" dirty="0" smtClean="0"/>
+              <a:t>Thread</a:t>
+            </a:r>
+            <a:endParaRPr lang="en-US" dirty="0"/>
+          </a:p>
+        </p:txBody>
+      </p:sp>
+      <p:sp>
+        <p:nvSpPr>
+          <p:cNvPr id="18" name="Cloud 17"/>
+          <p:cNvSpPr/>
+          <p:nvPr/>
+        </p:nvSpPr>
+        <p:spPr>
+          <a:xfrm>
+            <a:off x="8624808" y="2694122"/>
+            <a:ext cx="1821051" cy="1223075"/>
+          </a:xfrm>
+          <a:prstGeom prst="cloud">
+            <a:avLst/>
+          </a:prstGeom>
+          <a:solidFill>
+            <a:schemeClr val="accent6"/>
+          </a:solidFill>
+        </p:spPr>
+        <p:style>
+          <a:lnRef idx="2">
+            <a:schemeClr val="accent1">
+              <a:shade val="50000"/>
+            </a:schemeClr>
+          </a:lnRef>
+          <a:fillRef idx="1">
+            <a:schemeClr val="accent1"/>
+          </a:fillRef>
+          <a:effectRef idx="0">
+            <a:schemeClr val="accent1"/>
+          </a:effectRef>
+          <a:fontRef idx="minor">
+            <a:schemeClr val="lt1"/>
+          </a:fontRef>
+        </p:style>
+        <p:txBody>
+          <a:bodyPr rtlCol="0" anchor="ctr"/>
+          <a:lstStyle/>
+          <a:p>
+            <a:pPr algn="ctr"/>
+            <a:r>
+              <a:rPr lang="en-US" dirty="0" smtClean="0"/>
+              <a:t>Critical</a:t>
+            </a:r>
+          </a:p>
+          <a:p>
+            <a:pPr algn="ctr"/>
+            <a:r>
+              <a:rPr lang="en-US" dirty="0" smtClean="0"/>
+              <a:t>Section</a:t>
+            </a:r>
+            <a:endParaRPr lang="en-US" dirty="0"/>
+          </a:p>
+        </p:txBody>
+      </p:sp>
+      <p:sp>
+        <p:nvSpPr>
+          <p:cNvPr id="19" name="TextBox 18"/>
+          <p:cNvSpPr txBox="1"/>
+          <p:nvPr/>
+        </p:nvSpPr>
+        <p:spPr>
+          <a:xfrm>
+            <a:off x="3957140" y="3596298"/>
+            <a:ext cx="1880643" cy="369332"/>
+          </a:xfrm>
+          <a:prstGeom prst="rect">
+            <a:avLst/>
+          </a:prstGeom>
+          <a:noFill/>
+        </p:spPr>
+        <p:txBody>
+          <a:bodyPr wrap="none" rtlCol="0">
+            <a:spAutoFit/>
           </a:bodyPr>
           <a:lstStyle/>
           <a:p>
             <a:r>
               <a:rPr lang="en-US" dirty="0" smtClean="0"/>
+              <a:t>Delegation Queue</a:t>
+            </a:r>
+            <a:endParaRPr lang="en-US" dirty="0"/>
+          </a:p>
+        </p:txBody>
+      </p:sp>
+      <p:cxnSp>
+        <p:nvCxnSpPr>
+          <p:cNvPr id="21" name="Straight Arrow Connector 20"/>
+          <p:cNvCxnSpPr/>
+          <p:nvPr/>
+        </p:nvCxnSpPr>
+        <p:spPr>
+          <a:xfrm>
+            <a:off x="5711126" y="3305660"/>
+            <a:ext cx="604434" cy="0"/>
+          </a:xfrm>
+          <a:prstGeom prst="straightConnector1">
+            <a:avLst/>
+          </a:prstGeom>
+          <a:ln>
+            <a:solidFill>
+              <a:schemeClr val="tx1"/>
+            </a:solidFill>
+            <a:tailEnd type="arrow"/>
+          </a:ln>
+        </p:spPr>
+        <p:style>
+          <a:lnRef idx="1">
+            <a:schemeClr val="accent1"/>
+          </a:lnRef>
+          <a:fillRef idx="0">
+            <a:schemeClr val="accent1"/>
+          </a:fillRef>
+          <a:effectRef idx="0">
+            <a:schemeClr val="accent1"/>
+          </a:effectRef>
+          <a:fontRef idx="minor">
+            <a:schemeClr val="tx1"/>
+          </a:fontRef>
+        </p:style>
+      </p:cxnSp>
+      <p:cxnSp>
+        <p:nvCxnSpPr>
+          <p:cNvPr id="22" name="Straight Arrow Connector 21"/>
+          <p:cNvCxnSpPr/>
+          <p:nvPr/>
+        </p:nvCxnSpPr>
+        <p:spPr>
+          <a:xfrm>
+            <a:off x="3428138" y="3358826"/>
+            <a:ext cx="604434" cy="0"/>
+          </a:xfrm>
+          <a:prstGeom prst="straightConnector1">
+            <a:avLst/>
+          </a:prstGeom>
+          <a:ln>
+            <a:solidFill>
+              <a:schemeClr val="tx1"/>
+            </a:solidFill>
+            <a:tailEnd type="arrow"/>
+          </a:ln>
+        </p:spPr>
+        <p:style>
+          <a:lnRef idx="1">
+            <a:schemeClr val="accent1"/>
+          </a:lnRef>
+          <a:fillRef idx="0">
+            <a:schemeClr val="accent1"/>
+          </a:fillRef>
+          <a:effectRef idx="0">
+            <a:schemeClr val="accent1"/>
+          </a:effectRef>
+          <a:fontRef idx="minor">
+            <a:schemeClr val="tx1"/>
+          </a:fontRef>
+        </p:style>
+      </p:cxnSp>
+      <p:cxnSp>
+        <p:nvCxnSpPr>
+          <p:cNvPr id="23" name="Straight Arrow Connector 22"/>
+          <p:cNvCxnSpPr/>
+          <p:nvPr/>
+        </p:nvCxnSpPr>
+        <p:spPr>
+          <a:xfrm>
+            <a:off x="3433304" y="3553847"/>
+            <a:ext cx="604434" cy="0"/>
+          </a:xfrm>
+          <a:prstGeom prst="straightConnector1">
+            <a:avLst/>
+          </a:prstGeom>
+          <a:ln>
+            <a:solidFill>
+              <a:schemeClr val="tx1"/>
+            </a:solidFill>
+            <a:tailEnd type="arrow"/>
+          </a:ln>
+        </p:spPr>
+        <p:style>
+          <a:lnRef idx="1">
+            <a:schemeClr val="accent1"/>
+          </a:lnRef>
+          <a:fillRef idx="0">
+            <a:schemeClr val="accent1"/>
+          </a:fillRef>
+          <a:effectRef idx="0">
+            <a:schemeClr val="accent1"/>
+          </a:effectRef>
+          <a:fontRef idx="minor">
+            <a:schemeClr val="tx1"/>
+          </a:fontRef>
+        </p:style>
+      </p:cxnSp>
+      <p:cxnSp>
+        <p:nvCxnSpPr>
+          <p:cNvPr id="24" name="Straight Arrow Connector 23"/>
+          <p:cNvCxnSpPr/>
+          <p:nvPr/>
+        </p:nvCxnSpPr>
+        <p:spPr>
+          <a:xfrm>
+            <a:off x="3433304" y="3163806"/>
+            <a:ext cx="604434" cy="0"/>
+          </a:xfrm>
+          <a:prstGeom prst="straightConnector1">
+            <a:avLst/>
+          </a:prstGeom>
+          <a:ln>
+            <a:solidFill>
+              <a:schemeClr val="tx1"/>
+            </a:solidFill>
+            <a:tailEnd type="arrow"/>
+          </a:ln>
+        </p:spPr>
+        <p:style>
+          <a:lnRef idx="1">
+            <a:schemeClr val="accent1"/>
+          </a:lnRef>
+          <a:fillRef idx="0">
+            <a:schemeClr val="accent1"/>
+          </a:fillRef>
+          <a:effectRef idx="0">
+            <a:schemeClr val="accent1"/>
+          </a:effectRef>
+          <a:fontRef idx="minor">
+            <a:schemeClr val="tx1"/>
+          </a:fontRef>
+        </p:style>
+      </p:cxnSp>
+      <p:cxnSp>
+        <p:nvCxnSpPr>
+          <p:cNvPr id="25" name="Straight Arrow Connector 24"/>
+          <p:cNvCxnSpPr/>
+          <p:nvPr/>
+        </p:nvCxnSpPr>
+        <p:spPr>
+          <a:xfrm>
+            <a:off x="3428138" y="2999783"/>
+            <a:ext cx="604434" cy="0"/>
+          </a:xfrm>
+          <a:prstGeom prst="straightConnector1">
+            <a:avLst/>
+          </a:prstGeom>
+          <a:ln>
+            <a:solidFill>
+              <a:schemeClr val="tx1"/>
+            </a:solidFill>
+            <a:tailEnd type="arrow"/>
+          </a:ln>
+        </p:spPr>
+        <p:style>
+          <a:lnRef idx="1">
+            <a:schemeClr val="accent1"/>
+          </a:lnRef>
+          <a:fillRef idx="0">
+            <a:schemeClr val="accent1"/>
+          </a:fillRef>
+          <a:effectRef idx="0">
+            <a:schemeClr val="accent1"/>
+          </a:effectRef>
+          <a:fontRef idx="minor">
+            <a:schemeClr val="tx1"/>
+          </a:fontRef>
+        </p:style>
+      </p:cxnSp>
+      <p:cxnSp>
+        <p:nvCxnSpPr>
+          <p:cNvPr id="26" name="Straight Arrow Connector 25"/>
+          <p:cNvCxnSpPr/>
+          <p:nvPr/>
+        </p:nvCxnSpPr>
+        <p:spPr>
+          <a:xfrm>
+            <a:off x="7917052" y="3305659"/>
+            <a:ext cx="604434" cy="0"/>
+          </a:xfrm>
+          <a:prstGeom prst="straightConnector1">
+            <a:avLst/>
+          </a:prstGeom>
+          <a:ln>
+            <a:solidFill>
+              <a:schemeClr val="tx1"/>
+            </a:solidFill>
+            <a:tailEnd type="arrow"/>
+          </a:ln>
+        </p:spPr>
+        <p:style>
+          <a:lnRef idx="1">
+            <a:schemeClr val="accent1"/>
+          </a:lnRef>
+          <a:fillRef idx="0">
+            <a:schemeClr val="accent1"/>
+          </a:fillRef>
+          <a:effectRef idx="0">
+            <a:schemeClr val="accent1"/>
+          </a:effectRef>
+          <a:fontRef idx="minor">
+            <a:schemeClr val="tx1"/>
+          </a:fontRef>
+        </p:style>
+      </p:cxnSp>
+      <p:sp>
+        <p:nvSpPr>
+          <p:cNvPr id="29" name="TextBox 28"/>
+          <p:cNvSpPr txBox="1"/>
+          <p:nvPr/>
+        </p:nvSpPr>
+        <p:spPr>
+          <a:xfrm>
+            <a:off x="4316991" y="5003656"/>
+            <a:ext cx="3937488" cy="707886"/>
+          </a:xfrm>
+          <a:prstGeom prst="rect">
+            <a:avLst/>
+          </a:prstGeom>
+          <a:noFill/>
+        </p:spPr>
+        <p:txBody>
+          <a:bodyPr wrap="none" rtlCol="0">
+            <a:spAutoFit/>
+          </a:bodyPr>
+          <a:lstStyle/>
+          <a:p>
+            <a:r>
+              <a:rPr lang="en-US" sz="4000" dirty="0" smtClean="0"/>
               <a:t>Queue Delegation</a:t>
             </a:r>
-          </a:p>
-          <a:p>
-            <a:pPr lvl="1"/>
-            <a:r>
-              <a:rPr lang="en-US" dirty="0" smtClean="0"/>
-              <a:t>Multiple threads accessing a shared data structure </a:t>
-            </a:r>
-          </a:p>
-          <a:p>
-            <a:pPr lvl="1"/>
-            <a:r>
-              <a:rPr lang="en-US" dirty="0" smtClean="0"/>
-              <a:t>Locks – lead to slower, sequential behavior</a:t>
-            </a:r>
-          </a:p>
-          <a:p>
-            <a:pPr lvl="1"/>
-            <a:r>
-              <a:rPr lang="en-US" dirty="0" smtClean="0"/>
-              <a:t>Delegate task to a thread already operating on the data structure </a:t>
-            </a:r>
-          </a:p>
-          <a:p>
-            <a:pPr lvl="2"/>
-            <a:r>
-              <a:rPr lang="en-US" dirty="0" smtClean="0"/>
-              <a:t>No lock needs to be acquired</a:t>
-            </a:r>
-          </a:p>
-          <a:p>
-            <a:pPr lvl="2"/>
-            <a:r>
-              <a:rPr lang="en-US" dirty="0" smtClean="0"/>
-              <a:t>Thread can continue with other work</a:t>
-            </a:r>
-          </a:p>
-          <a:p>
-            <a:pPr lvl="1"/>
-            <a:r>
-              <a:rPr lang="en-US" dirty="0" smtClean="0"/>
-              <a:t>Delegate thread could be</a:t>
-            </a:r>
-          </a:p>
-          <a:p>
-            <a:pPr lvl="2"/>
-            <a:r>
-              <a:rPr lang="en-US" dirty="0" smtClean="0"/>
-              <a:t>Designated thread – same delegate thread throughout</a:t>
-            </a:r>
-          </a:p>
-          <a:p>
-            <a:pPr lvl="2"/>
-            <a:r>
-              <a:rPr lang="en-US" dirty="0" smtClean="0"/>
-              <a:t>Any thread – acquire a lock to become the delegate thread</a:t>
-            </a:r>
-          </a:p>
-          <a:p>
-            <a:pPr lvl="1"/>
-            <a:r>
-              <a:rPr lang="en-US" dirty="0" smtClean="0"/>
-              <a:t>Delegate thread executes the tasks from the delegation queue</a:t>
-            </a:r>
-          </a:p>
-          <a:p>
-            <a:pPr lvl="2"/>
-            <a:r>
-              <a:rPr lang="en-US" dirty="0" smtClean="0"/>
-              <a:t>Insertion doesn’t require locks – uses CAS</a:t>
-            </a:r>
-          </a:p>
-          <a:p>
-            <a:pPr lvl="2"/>
-            <a:r>
-              <a:rPr lang="en-US" dirty="0" smtClean="0"/>
-              <a:t>Queue stops accepting tasks after a limit is reached</a:t>
-            </a:r>
-          </a:p>
-          <a:p>
-            <a:pPr lvl="1"/>
-            <a:endParaRPr lang="en-US" dirty="0"/>
+            <a:endParaRPr lang="en-US" sz="4000" dirty="0"/>
+          </a:p>
+        </p:txBody>
+      </p:sp>
+      <p:sp>
+        <p:nvSpPr>
+          <p:cNvPr id="30" name="TextBox 29"/>
+          <p:cNvSpPr txBox="1"/>
+          <p:nvPr/>
+        </p:nvSpPr>
+        <p:spPr>
+          <a:xfrm>
+            <a:off x="3382502" y="2694122"/>
+            <a:ext cx="683007" cy="307777"/>
+          </a:xfrm>
+          <a:prstGeom prst="rect">
+            <a:avLst/>
+          </a:prstGeom>
+          <a:noFill/>
+        </p:spPr>
+        <p:txBody>
+          <a:bodyPr wrap="none" rtlCol="0">
+            <a:spAutoFit/>
+          </a:bodyPr>
+          <a:lstStyle/>
+          <a:p>
+            <a:pPr algn="ctr"/>
+            <a:r>
+              <a:rPr lang="en-US" sz="1400" dirty="0" smtClean="0"/>
+              <a:t>atomic</a:t>
+            </a:r>
+            <a:endParaRPr lang="en-US" sz="1400" dirty="0"/>
           </a:p>
         </p:txBody>
       </p:sp>
     </p:spTree>
     <p:extLst>
       <p:ext uri="{BB962C8B-B14F-4D97-AF65-F5344CB8AC3E}">
-        <p14:creationId xmlns:p14="http://schemas.microsoft.com/office/powerpoint/2010/main" val="350172969"/>
+        <p14:creationId xmlns:p14="http://schemas.microsoft.com/office/powerpoint/2010/main" val="1572643104"/>
       </p:ext>
     </p:extLst>
   </p:cSld>
@@ -3865,54 +4801,96 @@
         </p:nvSpPr>
         <p:spPr/>
         <p:txBody>
-          <a:bodyPr/>
-          <a:lstStyle/>
-          <a:p>
-            <a:r>
-              <a:rPr lang="en-US" dirty="0" smtClean="0"/>
-              <a:t>Elimination</a:t>
+          <a:bodyPr>
+            <a:normAutofit lnSpcReduction="10000"/>
+          </a:bodyPr>
+          <a:lstStyle/>
+          <a:p>
+            <a:r>
+              <a:rPr lang="en-US" dirty="0" smtClean="0"/>
+              <a:t>Queue Delegation</a:t>
             </a:r>
           </a:p>
           <a:p>
             <a:pPr lvl="1"/>
             <a:r>
               <a:rPr lang="en-US" dirty="0" smtClean="0"/>
-              <a:t>Operations with reverse semantics can be cancelled out</a:t>
+              <a:t>Multiple threads accessing a shared data structure </a:t>
+            </a:r>
+          </a:p>
+          <a:p>
+            <a:pPr lvl="1"/>
+            <a:r>
+              <a:rPr lang="en-US" dirty="0" smtClean="0"/>
+              <a:t>Locks – lead to slower, sequential behavior</a:t>
+            </a:r>
+          </a:p>
+          <a:p>
+            <a:pPr lvl="1"/>
+            <a:r>
+              <a:rPr lang="en-US" dirty="0" smtClean="0"/>
+              <a:t>Delegate task to a thread already operating on the data structure </a:t>
             </a:r>
           </a:p>
           <a:p>
             <a:pPr lvl="2"/>
             <a:r>
               <a:rPr lang="en-US" dirty="0" smtClean="0"/>
-              <a:t>For example, PUSH and POP operations on a stack</a:t>
+              <a:t>No lock needs to be acquired</a:t>
+            </a:r>
+          </a:p>
+          <a:p>
+            <a:pPr lvl="2"/>
+            <a:r>
+              <a:rPr lang="en-US" dirty="0" smtClean="0"/>
+              <a:t>Thread can continue with other work</a:t>
             </a:r>
           </a:p>
           <a:p>
             <a:pPr lvl="1"/>
             <a:r>
               <a:rPr lang="en-US" dirty="0" smtClean="0"/>
-              <a:t>Does not need to access the actual shared data structure</a:t>
+              <a:t>Delegate thread could be</a:t>
+            </a:r>
+          </a:p>
+          <a:p>
+            <a:pPr lvl="2"/>
+            <a:r>
+              <a:rPr lang="en-US" dirty="0" smtClean="0"/>
+              <a:t>Designated thread – same delegate thread throughout</a:t>
+            </a:r>
+          </a:p>
+          <a:p>
+            <a:pPr lvl="2"/>
+            <a:r>
+              <a:rPr lang="en-US" dirty="0" smtClean="0"/>
+              <a:t>Any thread – acquire a lock to become the delegate thread</a:t>
             </a:r>
           </a:p>
           <a:p>
             <a:pPr lvl="1"/>
             <a:r>
               <a:rPr lang="en-US" dirty="0" smtClean="0"/>
-              <a:t>Reduces contention – better performance</a:t>
-            </a:r>
-          </a:p>
-          <a:p>
-            <a:pPr lvl="1"/>
-            <a:r>
-              <a:rPr lang="en-US" dirty="0" smtClean="0"/>
-              <a:t>Implemented using an array of exchanger slots</a:t>
-            </a:r>
-          </a:p>
-          <a:p>
-            <a:pPr lvl="1"/>
-            <a:r>
-              <a:rPr lang="en-US" dirty="0" smtClean="0"/>
-              <a:t>No locks needed – uses CAS</a:t>
+              <a:t>Delegate thread executes the tasks from the delegation queue</a:t>
+            </a:r>
+          </a:p>
+          <a:p>
+            <a:pPr lvl="2"/>
+            <a:r>
+              <a:rPr lang="en-US" dirty="0" smtClean="0"/>
+              <a:t>Insertion doesn’t require locks – uses </a:t>
+            </a:r>
+            <a:r>
+              <a:rPr lang="en-US" dirty="0" smtClean="0"/>
+              <a:t>atomic types or CAS</a:t>
+            </a:r>
+            <a:endParaRPr lang="en-US" dirty="0" smtClean="0"/>
+          </a:p>
+          <a:p>
+            <a:pPr lvl="2"/>
+            <a:r>
+              <a:rPr lang="en-US" dirty="0" smtClean="0"/>
+              <a:t>Queue stops accepting tasks after a limit is reached</a:t>
             </a:r>
           </a:p>
           <a:p>
@@ -3924,7 +4902,7 @@
     </p:spTree>
     <p:extLst>
       <p:ext uri="{BB962C8B-B14F-4D97-AF65-F5344CB8AC3E}">
-        <p14:creationId xmlns:p14="http://schemas.microsoft.com/office/powerpoint/2010/main" val="723421969"/>
+        <p14:creationId xmlns:p14="http://schemas.microsoft.com/office/powerpoint/2010/main" val="350172969"/>
       </p:ext>
     </p:extLst>
   </p:cSld>
@@ -3968,7 +4946,7 @@
           <a:p>
             <a:r>
               <a:rPr lang="en-US" dirty="0" smtClean="0"/>
-              <a:t>Implementation</a:t>
+              <a:t>Background</a:t>
             </a:r>
             <a:endParaRPr lang="en-US" dirty="0"/>
           </a:p>
@@ -3990,67 +4968,61 @@
           <a:lstStyle/>
           <a:p>
             <a:r>
-              <a:rPr lang="en-US" dirty="0" err="1" smtClean="0"/>
-              <a:t>MonitorT</a:t>
-            </a:r>
-            <a:r>
-              <a:rPr lang="en-US" dirty="0" smtClean="0"/>
-              <a:t> </a:t>
-            </a:r>
-            <a:r>
-              <a:rPr lang="en-US" baseline="30000" dirty="0" smtClean="0"/>
-              <a:t>[2]</a:t>
-            </a:r>
+              <a:rPr lang="en-US" dirty="0" smtClean="0"/>
+              <a:t>Multiple threads accessing a single structure increases contention, reduces performance</a:t>
+            </a:r>
+          </a:p>
+          <a:p>
+            <a:r>
+              <a:rPr lang="en-US" dirty="0" smtClean="0"/>
+              <a:t>Elimination</a:t>
+            </a:r>
+            <a:endParaRPr lang="en-US" dirty="0" smtClean="0"/>
           </a:p>
           <a:p>
             <a:pPr lvl="1"/>
             <a:r>
               <a:rPr lang="en-US" dirty="0" smtClean="0"/>
-              <a:t>Used to compare performance against our implementation</a:t>
+              <a:t>Operations with reverse semantics can be cancelled out</a:t>
+            </a:r>
+          </a:p>
+          <a:p>
+            <a:pPr lvl="2"/>
+            <a:r>
+              <a:rPr lang="en-US" dirty="0" smtClean="0"/>
+              <a:t>For example, PUSH and POP operations on a stack</a:t>
             </a:r>
           </a:p>
           <a:p>
             <a:pPr lvl="1"/>
             <a:r>
               <a:rPr lang="en-US" dirty="0" smtClean="0"/>
-              <a:t>Implemented in JAVA</a:t>
+              <a:t>Does not need to access the actual shared data structure</a:t>
             </a:r>
           </a:p>
           <a:p>
             <a:pPr lvl="1"/>
             <a:r>
               <a:rPr lang="en-US" dirty="0" smtClean="0"/>
-              <a:t>Uses queue delegation without elimination</a:t>
-            </a:r>
-          </a:p>
-          <a:p>
-            <a:pPr lvl="2"/>
-            <a:r>
-              <a:rPr lang="en-US" dirty="0" smtClean="0"/>
-              <a:t>Uses a designated delegate “manager” thread throughout the execution</a:t>
+              <a:t>Reduces contention – better performance</a:t>
             </a:r>
           </a:p>
           <a:p>
             <a:pPr lvl="1"/>
             <a:r>
               <a:rPr lang="en-US" dirty="0" smtClean="0"/>
-              <a:t>We did not add elimination to the </a:t>
-            </a:r>
-            <a:r>
-              <a:rPr lang="en-US" dirty="0" err="1" smtClean="0"/>
-              <a:t>MonitorT</a:t>
-            </a:r>
-            <a:r>
-              <a:rPr lang="en-US" dirty="0" smtClean="0"/>
-              <a:t> libraries</a:t>
-            </a:r>
-          </a:p>
-          <a:p>
-            <a:pPr lvl="2"/>
-            <a:r>
-              <a:rPr lang="en-US" dirty="0" smtClean="0"/>
-              <a:t>Modified a different set of libraries, discussed in the next slide</a:t>
-            </a:r>
+              <a:t>Implemented using an array of exchanger slots</a:t>
+            </a:r>
+          </a:p>
+          <a:p>
+            <a:pPr lvl="1"/>
+            <a:r>
+              <a:rPr lang="en-US" dirty="0" smtClean="0"/>
+              <a:t>No locks needed – uses CAS</a:t>
+            </a:r>
+          </a:p>
+          <a:p>
+            <a:pPr lvl="1"/>
             <a:endParaRPr lang="en-US" dirty="0"/>
           </a:p>
         </p:txBody>
@@ -4058,7 +5030,7 @@
     </p:spTree>
     <p:extLst>
       <p:ext uri="{BB962C8B-B14F-4D97-AF65-F5344CB8AC3E}">
-        <p14:creationId xmlns:p14="http://schemas.microsoft.com/office/powerpoint/2010/main" val="1780797639"/>
+        <p14:creationId xmlns:p14="http://schemas.microsoft.com/office/powerpoint/2010/main" val="723421969"/>
       </p:ext>
     </p:extLst>
   </p:cSld>
@@ -4102,7 +5074,7 @@
           <a:p>
             <a:r>
               <a:rPr lang="en-US" dirty="0" smtClean="0"/>
-              <a:t>Implementation	</a:t>
+              <a:t>Implementation</a:t>
             </a:r>
             <a:endParaRPr lang="en-US" dirty="0"/>
           </a:p>
@@ -4120,129 +5092,80 @@
         </p:nvSpPr>
         <p:spPr/>
         <p:txBody>
-          <a:bodyPr>
-            <a:normAutofit lnSpcReduction="10000"/>
-          </a:bodyPr>
-          <a:lstStyle/>
-          <a:p>
-            <a:r>
-              <a:rPr lang="en-US" dirty="0" smtClean="0"/>
-              <a:t>Queue Delegation</a:t>
+          <a:bodyPr/>
+          <a:lstStyle/>
+          <a:p>
+            <a:r>
+              <a:rPr lang="en-US" dirty="0" err="1" smtClean="0"/>
+              <a:t>MonitorT</a:t>
+            </a:r>
+            <a:r>
+              <a:rPr lang="en-US" dirty="0" smtClean="0"/>
+              <a:t> </a:t>
+            </a:r>
+            <a:r>
+              <a:rPr lang="en-US" baseline="30000" dirty="0" smtClean="0"/>
+              <a:t>[2]</a:t>
             </a:r>
           </a:p>
           <a:p>
             <a:pPr lvl="1"/>
             <a:r>
               <a:rPr lang="en-US" dirty="0" smtClean="0"/>
-              <a:t>Uses “Queue Delegation Locking” C++ libraries published by </a:t>
+              <a:t>Used to compare performance against our implementation</a:t>
+            </a:r>
+          </a:p>
+          <a:p>
+            <a:pPr lvl="1"/>
+            <a:r>
+              <a:rPr lang="en-US" dirty="0" smtClean="0"/>
+              <a:t>JAVA-based</a:t>
+            </a:r>
+            <a:endParaRPr lang="en-US" dirty="0" smtClean="0"/>
+          </a:p>
+          <a:p>
+            <a:pPr lvl="1"/>
+            <a:r>
+              <a:rPr lang="en-US" dirty="0" smtClean="0"/>
+              <a:t>Uses queue delegation without elimination</a:t>
+            </a:r>
+          </a:p>
+          <a:p>
+            <a:pPr lvl="2"/>
+            <a:r>
+              <a:rPr lang="en-US" dirty="0" smtClean="0"/>
+              <a:t>Uses a designated delegate “manager” thread throughout the execution</a:t>
+            </a:r>
+          </a:p>
+          <a:p>
+            <a:pPr lvl="1"/>
+            <a:r>
+              <a:rPr lang="en-US" dirty="0" smtClean="0"/>
+              <a:t>We did not add elimination to the </a:t>
             </a:r>
             <a:r>
               <a:rPr lang="en-US" dirty="0" err="1" smtClean="0"/>
-              <a:t>Klaftenegger</a:t>
-            </a:r>
-            <a:r>
-              <a:rPr lang="en-US" baseline="30000" dirty="0" smtClean="0"/>
-              <a:t>[1]</a:t>
-            </a:r>
-            <a:endParaRPr lang="en-US" baseline="30000" dirty="0"/>
-          </a:p>
-          <a:p>
-            <a:pPr lvl="1"/>
-            <a:r>
-              <a:rPr lang="en-US" dirty="0" smtClean="0"/>
-              <a:t>Allows any worker thread to become the delegate thread by acquiring a lock</a:t>
-            </a:r>
-          </a:p>
-          <a:p>
-            <a:pPr lvl="1"/>
-            <a:r>
-              <a:rPr lang="en-US" dirty="0" smtClean="0"/>
-              <a:t>Delegate thread </a:t>
+              <a:t>MonitorT</a:t>
+            </a:r>
+            <a:r>
+              <a:rPr lang="en-US" dirty="0" smtClean="0"/>
+              <a:t> libraries</a:t>
             </a:r>
           </a:p>
           <a:p>
             <a:pPr lvl="2"/>
             <a:r>
               <a:rPr lang="en-US" dirty="0" smtClean="0"/>
-              <a:t>Acquires the lock</a:t>
-            </a:r>
-          </a:p>
-          <a:p>
-            <a:pPr lvl="2"/>
-            <a:r>
-              <a:rPr lang="en-US" dirty="0"/>
-              <a:t>O</a:t>
-            </a:r>
-            <a:r>
-              <a:rPr lang="en-US" dirty="0" smtClean="0"/>
-              <a:t>pens the delegation queue to start accepting tasks till the maximum limit is reached</a:t>
-            </a:r>
-          </a:p>
-          <a:p>
-            <a:pPr lvl="2"/>
-            <a:r>
-              <a:rPr lang="en-US" dirty="0"/>
-              <a:t>E</a:t>
-            </a:r>
-            <a:r>
-              <a:rPr lang="en-US" dirty="0" smtClean="0"/>
-              <a:t>xecutes all the tasks in the queue </a:t>
+              <a:t>Modified a different set of libraries, discussed in the next slide</a:t>
             </a:r>
             <a:endParaRPr lang="en-US" dirty="0"/>
-          </a:p>
-          <a:p>
-            <a:pPr lvl="2"/>
-            <a:r>
-              <a:rPr lang="en-US" dirty="0" smtClean="0"/>
-              <a:t>Returns the results to the threads using promise and future variables</a:t>
-            </a:r>
-          </a:p>
-          <a:p>
-            <a:pPr lvl="2"/>
-            <a:r>
-              <a:rPr lang="en-US" dirty="0" smtClean="0"/>
-              <a:t>Releases the lock once the queue is empty</a:t>
-            </a:r>
-          </a:p>
-          <a:p>
-            <a:pPr lvl="1"/>
-            <a:r>
-              <a:rPr lang="en-US" dirty="0" smtClean="0"/>
-              <a:t>Important attribute affecting performance:</a:t>
-            </a:r>
-          </a:p>
-          <a:p>
-            <a:pPr lvl="2"/>
-            <a:r>
-              <a:rPr lang="en-US" dirty="0" smtClean="0"/>
-              <a:t>Maximum allowed queue length</a:t>
-            </a:r>
-          </a:p>
-          <a:p>
-            <a:pPr lvl="2"/>
-            <a:r>
-              <a:rPr lang="en-US" dirty="0" smtClean="0"/>
-              <a:t>Using a worker thread as a delegate thread (not a dedicated delegate thread)</a:t>
-            </a:r>
-          </a:p>
-          <a:p>
-            <a:pPr lvl="1"/>
-            <a:endParaRPr lang="en-US" dirty="0" smtClean="0"/>
-          </a:p>
-          <a:p>
-            <a:pPr lvl="2"/>
-            <a:endParaRPr lang="en-US" dirty="0"/>
-          </a:p>
-          <a:p>
-            <a:pPr lvl="1"/>
-            <a:endParaRPr lang="en-US" dirty="0" smtClean="0"/>
           </a:p>
         </p:txBody>
       </p:sp>
     </p:spTree>
     <p:extLst>
       <p:ext uri="{BB962C8B-B14F-4D97-AF65-F5344CB8AC3E}">
-        <p14:creationId xmlns:p14="http://schemas.microsoft.com/office/powerpoint/2010/main" val="4153082639"/>
+        <p14:creationId xmlns:p14="http://schemas.microsoft.com/office/powerpoint/2010/main" val="1780797639"/>
       </p:ext>
     </p:extLst>
   </p:cSld>
@@ -4286,7 +5209,7 @@
           <a:p>
             <a:r>
               <a:rPr lang="en-US" dirty="0" smtClean="0"/>
-              <a:t>Implementation</a:t>
+              <a:t>Implementation	</a:t>
             </a:r>
             <a:endParaRPr lang="en-US" dirty="0"/>
           </a:p>
@@ -4302,151 +5225,131 @@
             <p:ph idx="1"/>
           </p:nvPr>
         </p:nvSpPr>
-        <p:spPr>
-          <a:xfrm>
-            <a:off x="838200" y="1365161"/>
-            <a:ext cx="10515600" cy="5228822"/>
-          </a:xfrm>
-        </p:spPr>
+        <p:spPr/>
         <p:txBody>
           <a:bodyPr>
-            <a:normAutofit fontScale="92500" lnSpcReduction="10000"/>
+            <a:normAutofit lnSpcReduction="10000"/>
           </a:bodyPr>
           <a:lstStyle/>
           <a:p>
             <a:r>
               <a:rPr lang="en-US" dirty="0" smtClean="0"/>
-              <a:t>Elimination</a:t>
+              <a:t>Queue Delegation</a:t>
             </a:r>
           </a:p>
           <a:p>
             <a:pPr lvl="1"/>
             <a:r>
               <a:rPr lang="en-US" dirty="0" smtClean="0"/>
-              <a:t>Added elimination to the existing queue delegation for implementing a shared stack</a:t>
-            </a:r>
+              <a:t>Uses “Queue Delegation Locking” C++ libraries published by </a:t>
+            </a:r>
+            <a:r>
+              <a:rPr lang="en-US" dirty="0" err="1" smtClean="0"/>
+              <a:t>Klaftenegger</a:t>
+            </a:r>
+            <a:r>
+              <a:rPr lang="en-US" baseline="30000" dirty="0" smtClean="0"/>
+              <a:t>[1]</a:t>
+            </a:r>
+            <a:endParaRPr lang="en-US" baseline="30000" dirty="0"/>
           </a:p>
           <a:p>
             <a:pPr lvl="1"/>
             <a:r>
               <a:rPr lang="en-US" dirty="0" smtClean="0"/>
-              <a:t>Exchanger has four states:</a:t>
+              <a:t>Allows any worker thread to become the delegate thread by acquiring a lock</a:t>
+            </a:r>
+          </a:p>
+          <a:p>
+            <a:pPr lvl="1"/>
+            <a:r>
+              <a:rPr lang="en-US" dirty="0" smtClean="0"/>
+              <a:t>Delegate thread </a:t>
             </a:r>
           </a:p>
           <a:p>
             <a:pPr lvl="2"/>
             <a:r>
               <a:rPr lang="en-US" dirty="0" smtClean="0"/>
-              <a:t>EMPTY, PUSH_WAIT, POP_WAIT, BUSY</a:t>
+              <a:t>Acquires the lock</a:t>
             </a:r>
           </a:p>
           <a:p>
             <a:pPr lvl="2"/>
             <a:r>
-              <a:rPr lang="en-US" dirty="0" smtClean="0"/>
-              <a:t>Helps prevent false matches</a:t>
+              <a:rPr lang="en-US" dirty="0"/>
+              <a:t>O</a:t>
+            </a:r>
+            <a:r>
+              <a:rPr lang="en-US" dirty="0" smtClean="0"/>
+              <a:t>pens the delegation queue to start accepting tasks till the maximum limit is reached</a:t>
+            </a:r>
+          </a:p>
+          <a:p>
+            <a:pPr lvl="2"/>
+            <a:r>
+              <a:rPr lang="en-US" dirty="0"/>
+              <a:t>E</a:t>
+            </a:r>
+            <a:r>
+              <a:rPr lang="en-US" dirty="0" smtClean="0"/>
+              <a:t>xecutes all the tasks in the queue </a:t>
+            </a:r>
+            <a:endParaRPr lang="en-US" dirty="0"/>
+          </a:p>
+          <a:p>
+            <a:pPr lvl="2"/>
+            <a:r>
+              <a:rPr lang="en-US" dirty="0" smtClean="0"/>
+              <a:t>Returns the results to the threads using promise and future variables</a:t>
+            </a:r>
+          </a:p>
+          <a:p>
+            <a:pPr lvl="2"/>
+            <a:r>
+              <a:rPr lang="en-US" dirty="0" smtClean="0"/>
+              <a:t>Releases the lock once the queue is empty</a:t>
             </a:r>
           </a:p>
           <a:p>
             <a:pPr lvl="1"/>
             <a:r>
               <a:rPr lang="en-US" dirty="0" smtClean="0"/>
-              <a:t>Any worker thread</a:t>
+              <a:t>Important attribute affecting performance:</a:t>
             </a:r>
           </a:p>
           <a:p>
             <a:pPr lvl="2"/>
             <a:r>
               <a:rPr lang="en-US" dirty="0" smtClean="0"/>
-              <a:t>Tries to acquire the delegation lock</a:t>
-            </a:r>
-          </a:p>
-          <a:p>
-            <a:pPr lvl="3"/>
-            <a:r>
-              <a:rPr lang="en-US" dirty="0" smtClean="0"/>
-              <a:t>If fails, tries to </a:t>
-            </a:r>
-            <a:r>
-              <a:rPr lang="en-US" dirty="0" err="1" smtClean="0"/>
-              <a:t>enqueue</a:t>
-            </a:r>
-            <a:r>
-              <a:rPr lang="en-US" dirty="0" smtClean="0"/>
-              <a:t> its task for delegation</a:t>
-            </a:r>
-          </a:p>
-          <a:p>
-            <a:pPr lvl="4"/>
-            <a:r>
-              <a:rPr lang="en-US" dirty="0" smtClean="0"/>
-              <a:t>If it fails to </a:t>
-            </a:r>
-            <a:r>
-              <a:rPr lang="en-US" dirty="0" err="1" smtClean="0"/>
-              <a:t>enqueue</a:t>
-            </a:r>
-            <a:r>
-              <a:rPr lang="en-US" dirty="0" smtClean="0"/>
-              <a:t> (queue was closed or full)</a:t>
-            </a:r>
-          </a:p>
-          <a:p>
-            <a:pPr lvl="5"/>
-            <a:r>
-              <a:rPr lang="en-US" dirty="0" smtClean="0"/>
-              <a:t>Tries to enter the elimination array</a:t>
-            </a:r>
-          </a:p>
-          <a:p>
-            <a:pPr lvl="5"/>
-            <a:r>
-              <a:rPr lang="en-US" dirty="0" smtClean="0"/>
-              <a:t>If it gets a match, exchanges the values and leaves</a:t>
-            </a:r>
-          </a:p>
-          <a:p>
-            <a:pPr lvl="5"/>
-            <a:r>
-              <a:rPr lang="en-US" dirty="0" smtClean="0"/>
-              <a:t>Else, waits for a match to happen, till it times out</a:t>
+              <a:t>Maximum allowed queue length</a:t>
             </a:r>
           </a:p>
           <a:p>
             <a:pPr lvl="2"/>
             <a:r>
               <a:rPr lang="en-US" dirty="0" smtClean="0"/>
-              <a:t>If no match was found, starts over  </a:t>
+              <a:t>Using a worker thread as a delegate thread (not a dedicated delegate thread)</a:t>
             </a:r>
           </a:p>
           <a:p>
             <a:pPr lvl="1"/>
-            <a:r>
-              <a:rPr lang="en-US" dirty="0" smtClean="0"/>
-              <a:t>Important attributes affecting the performance:</a:t>
-            </a:r>
+            <a:endParaRPr lang="en-US" dirty="0" smtClean="0"/>
           </a:p>
           <a:p>
             <a:pPr lvl="2"/>
-            <a:r>
-              <a:rPr lang="en-US" dirty="0" smtClean="0"/>
-              <a:t>Array length</a:t>
-            </a:r>
-          </a:p>
-          <a:p>
-            <a:pPr lvl="2"/>
-            <a:r>
-              <a:rPr lang="en-US" dirty="0" smtClean="0"/>
-              <a:t>Range policy</a:t>
-            </a:r>
             <a:endParaRPr lang="en-US" dirty="0"/>
+          </a:p>
+          <a:p>
+            <a:pPr lvl="1"/>
+            <a:endParaRPr lang="en-US" dirty="0" smtClean="0"/>
           </a:p>
         </p:txBody>
       </p:sp>
     </p:spTree>
     <p:extLst>
       <p:ext uri="{BB962C8B-B14F-4D97-AF65-F5344CB8AC3E}">
-        <p14:creationId xmlns:p14="http://schemas.microsoft.com/office/powerpoint/2010/main" val="2992746129"/>
+        <p14:creationId xmlns:p14="http://schemas.microsoft.com/office/powerpoint/2010/main" val="4153082639"/>
       </p:ext>
     </p:extLst>
   </p:cSld>
@@ -4490,40 +5393,718 @@
           <a:p>
             <a:r>
               <a:rPr lang="en-US" dirty="0" smtClean="0"/>
-              <a:t>Results</a:t>
+              <a:t>Implementation</a:t>
             </a:r>
             <a:endParaRPr lang="en-US" dirty="0"/>
           </a:p>
         </p:txBody>
       </p:sp>
-      <p:pic>
-        <p:nvPicPr>
-          <p:cNvPr id="4" name="Picture 3"/>
-          <p:cNvPicPr>
-            <a:picLocks noChangeAspect="1"/>
-          </p:cNvPicPr>
-          <p:nvPr/>
-        </p:nvPicPr>
-        <p:blipFill>
-          <a:blip r:embed="rId2"/>
-          <a:stretch>
-            <a:fillRect/>
-          </a:stretch>
-        </p:blipFill>
+      <p:sp>
+        <p:nvSpPr>
+          <p:cNvPr id="3" name="Content Placeholder 2"/>
+          <p:cNvSpPr>
+            <a:spLocks noGrp="1"/>
+          </p:cNvSpPr>
+          <p:nvPr>
+            <p:ph idx="1"/>
+          </p:nvPr>
+        </p:nvSpPr>
         <p:spPr>
           <a:xfrm>
-            <a:off x="1632195" y="1690688"/>
-            <a:ext cx="8619388" cy="4871372"/>
+            <a:off x="838199" y="1825625"/>
+            <a:ext cx="6739467" cy="4351338"/>
+          </a:xfrm>
+        </p:spPr>
+        <p:txBody>
+          <a:bodyPr>
+            <a:normAutofit/>
+          </a:bodyPr>
+          <a:lstStyle/>
+          <a:p>
+            <a:r>
+              <a:rPr lang="en-US" dirty="0"/>
+              <a:t>Elimination</a:t>
+            </a:r>
+          </a:p>
+          <a:p>
+            <a:pPr lvl="1"/>
+            <a:r>
+              <a:rPr lang="en-US" dirty="0"/>
+              <a:t>Added elimination to the existing queue delegation for implementing a shared stack</a:t>
+            </a:r>
+          </a:p>
+          <a:p>
+            <a:r>
+              <a:rPr lang="en-US" dirty="0" smtClean="0"/>
+              <a:t>Elimination worker thread</a:t>
+            </a:r>
+            <a:endParaRPr lang="en-US" sz="2000" dirty="0"/>
+          </a:p>
+          <a:p>
+            <a:pPr lvl="1"/>
+            <a:r>
+              <a:rPr lang="en-US" dirty="0"/>
+              <a:t>Tries to acquire the delegation lock</a:t>
+            </a:r>
+          </a:p>
+          <a:p>
+            <a:pPr lvl="2"/>
+            <a:r>
+              <a:rPr lang="en-US" dirty="0"/>
+              <a:t>If fails, tries to </a:t>
+            </a:r>
+            <a:r>
+              <a:rPr lang="en-US" dirty="0" err="1"/>
+              <a:t>enqueue</a:t>
+            </a:r>
+            <a:r>
+              <a:rPr lang="en-US" dirty="0"/>
+              <a:t> its task for delegation</a:t>
+            </a:r>
+          </a:p>
+          <a:p>
+            <a:pPr lvl="3"/>
+            <a:r>
+              <a:rPr lang="en-US" sz="1600" dirty="0"/>
+              <a:t>If it fails to </a:t>
+            </a:r>
+            <a:r>
+              <a:rPr lang="en-US" sz="1600" dirty="0" err="1"/>
+              <a:t>enqueue</a:t>
+            </a:r>
+            <a:r>
+              <a:rPr lang="en-US" sz="1600" dirty="0"/>
+              <a:t> (queue was closed or full)</a:t>
+            </a:r>
+          </a:p>
+          <a:p>
+            <a:pPr lvl="4"/>
+            <a:r>
+              <a:rPr lang="en-US" sz="1600" dirty="0"/>
+              <a:t>Tries to enter the elimination array</a:t>
+            </a:r>
+          </a:p>
+          <a:p>
+            <a:pPr lvl="4"/>
+            <a:r>
+              <a:rPr lang="en-US" sz="1600" dirty="0"/>
+              <a:t>If it gets a match, exchanges the values and leaves</a:t>
+            </a:r>
+          </a:p>
+          <a:p>
+            <a:pPr lvl="4"/>
+            <a:r>
+              <a:rPr lang="en-US" sz="1600" dirty="0"/>
+              <a:t>Else, waits for a match to happen, till it times out</a:t>
+            </a:r>
+          </a:p>
+          <a:p>
+            <a:pPr lvl="1"/>
+            <a:r>
+              <a:rPr lang="en-US" dirty="0"/>
+              <a:t>If no match was found, starts over  </a:t>
+            </a:r>
+          </a:p>
+          <a:p>
+            <a:endParaRPr lang="en-US" sz="2400" dirty="0"/>
+          </a:p>
+        </p:txBody>
+      </p:sp>
+      <p:sp>
+        <p:nvSpPr>
+          <p:cNvPr id="4" name="Rectangle 3"/>
+          <p:cNvSpPr/>
+          <p:nvPr/>
+        </p:nvSpPr>
+        <p:spPr>
+          <a:xfrm>
+            <a:off x="7361285" y="2379933"/>
+            <a:ext cx="1481667" cy="829733"/>
           </a:xfrm>
           <a:prstGeom prst="rect">
             <a:avLst/>
           </a:prstGeom>
         </p:spPr>
-      </p:pic>
+        <p:style>
+          <a:lnRef idx="2">
+            <a:schemeClr val="accent1">
+              <a:shade val="50000"/>
+            </a:schemeClr>
+          </a:lnRef>
+          <a:fillRef idx="1">
+            <a:schemeClr val="accent1"/>
+          </a:fillRef>
+          <a:effectRef idx="0">
+            <a:schemeClr val="accent1"/>
+          </a:effectRef>
+          <a:fontRef idx="minor">
+            <a:schemeClr val="lt1"/>
+          </a:fontRef>
+        </p:style>
+        <p:txBody>
+          <a:bodyPr rtlCol="0" anchor="ctr"/>
+          <a:lstStyle/>
+          <a:p>
+            <a:pPr algn="ctr"/>
+            <a:r>
+              <a:rPr lang="en-US" dirty="0" smtClean="0"/>
+              <a:t>Becomes delegate thread</a:t>
+            </a:r>
+            <a:endParaRPr lang="en-US" dirty="0"/>
+          </a:p>
+        </p:txBody>
+      </p:sp>
+      <p:sp>
+        <p:nvSpPr>
+          <p:cNvPr id="5" name="Rectangle 4"/>
+          <p:cNvSpPr/>
+          <p:nvPr/>
+        </p:nvSpPr>
+        <p:spPr>
+          <a:xfrm>
+            <a:off x="9174830" y="2379933"/>
+            <a:ext cx="1481667" cy="829733"/>
+          </a:xfrm>
+          <a:prstGeom prst="rect">
+            <a:avLst/>
+          </a:prstGeom>
+        </p:spPr>
+        <p:style>
+          <a:lnRef idx="2">
+            <a:schemeClr val="accent1">
+              <a:shade val="50000"/>
+            </a:schemeClr>
+          </a:lnRef>
+          <a:fillRef idx="1">
+            <a:schemeClr val="accent1"/>
+          </a:fillRef>
+          <a:effectRef idx="0">
+            <a:schemeClr val="accent1"/>
+          </a:effectRef>
+          <a:fontRef idx="minor">
+            <a:schemeClr val="lt1"/>
+          </a:fontRef>
+        </p:style>
+        <p:txBody>
+          <a:bodyPr rtlCol="0" anchor="ctr"/>
+          <a:lstStyle/>
+          <a:p>
+            <a:pPr algn="ctr"/>
+            <a:r>
+              <a:rPr lang="en-US" dirty="0" smtClean="0"/>
+              <a:t>Tries to </a:t>
+            </a:r>
+            <a:r>
+              <a:rPr lang="en-US" dirty="0" err="1" smtClean="0"/>
+              <a:t>enqueue</a:t>
+            </a:r>
+            <a:r>
+              <a:rPr lang="en-US" dirty="0" smtClean="0"/>
+              <a:t> task</a:t>
+            </a:r>
+            <a:endParaRPr lang="en-US" dirty="0"/>
+          </a:p>
+        </p:txBody>
+      </p:sp>
+      <p:sp>
+        <p:nvSpPr>
+          <p:cNvPr id="6" name="Rectangle 5"/>
+          <p:cNvSpPr/>
+          <p:nvPr/>
+        </p:nvSpPr>
+        <p:spPr>
+          <a:xfrm>
+            <a:off x="7945722" y="3883164"/>
+            <a:ext cx="1481667" cy="829733"/>
+          </a:xfrm>
+          <a:prstGeom prst="rect">
+            <a:avLst/>
+          </a:prstGeom>
+        </p:spPr>
+        <p:style>
+          <a:lnRef idx="2">
+            <a:schemeClr val="accent1">
+              <a:shade val="50000"/>
+            </a:schemeClr>
+          </a:lnRef>
+          <a:fillRef idx="1">
+            <a:schemeClr val="accent1"/>
+          </a:fillRef>
+          <a:effectRef idx="0">
+            <a:schemeClr val="accent1"/>
+          </a:effectRef>
+          <a:fontRef idx="minor">
+            <a:schemeClr val="lt1"/>
+          </a:fontRef>
+        </p:style>
+        <p:txBody>
+          <a:bodyPr rtlCol="0" anchor="ctr"/>
+          <a:lstStyle/>
+          <a:p>
+            <a:pPr algn="ctr"/>
+            <a:r>
+              <a:rPr lang="en-US" dirty="0" smtClean="0"/>
+              <a:t>Gets promise/ future value</a:t>
+            </a:r>
+            <a:endParaRPr lang="en-US" dirty="0"/>
+          </a:p>
+        </p:txBody>
+      </p:sp>
+      <p:sp>
+        <p:nvSpPr>
+          <p:cNvPr id="7" name="Rectangle 6"/>
+          <p:cNvSpPr/>
+          <p:nvPr/>
+        </p:nvSpPr>
+        <p:spPr>
+          <a:xfrm>
+            <a:off x="9687863" y="3883166"/>
+            <a:ext cx="1481667" cy="829733"/>
+          </a:xfrm>
+          <a:prstGeom prst="rect">
+            <a:avLst/>
+          </a:prstGeom>
+        </p:spPr>
+        <p:style>
+          <a:lnRef idx="2">
+            <a:schemeClr val="accent1">
+              <a:shade val="50000"/>
+            </a:schemeClr>
+          </a:lnRef>
+          <a:fillRef idx="1">
+            <a:schemeClr val="accent1"/>
+          </a:fillRef>
+          <a:effectRef idx="0">
+            <a:schemeClr val="accent1"/>
+          </a:effectRef>
+          <a:fontRef idx="minor">
+            <a:schemeClr val="lt1"/>
+          </a:fontRef>
+        </p:style>
+        <p:txBody>
+          <a:bodyPr rtlCol="0" anchor="ctr"/>
+          <a:lstStyle/>
+          <a:p>
+            <a:pPr algn="ctr"/>
+            <a:r>
+              <a:rPr lang="en-US" dirty="0" smtClean="0"/>
+              <a:t>Access elimination array</a:t>
+            </a:r>
+            <a:endParaRPr lang="en-US" dirty="0"/>
+          </a:p>
+        </p:txBody>
+      </p:sp>
+      <p:sp>
+        <p:nvSpPr>
+          <p:cNvPr id="8" name="Rectangle 7"/>
+          <p:cNvSpPr/>
+          <p:nvPr/>
+        </p:nvSpPr>
+        <p:spPr>
+          <a:xfrm>
+            <a:off x="8638474" y="5314352"/>
+            <a:ext cx="1481667" cy="829733"/>
+          </a:xfrm>
+          <a:prstGeom prst="rect">
+            <a:avLst/>
+          </a:prstGeom>
+        </p:spPr>
+        <p:style>
+          <a:lnRef idx="2">
+            <a:schemeClr val="accent1">
+              <a:shade val="50000"/>
+            </a:schemeClr>
+          </a:lnRef>
+          <a:fillRef idx="1">
+            <a:schemeClr val="accent1"/>
+          </a:fillRef>
+          <a:effectRef idx="0">
+            <a:schemeClr val="accent1"/>
+          </a:effectRef>
+          <a:fontRef idx="minor">
+            <a:schemeClr val="lt1"/>
+          </a:fontRef>
+        </p:style>
+        <p:txBody>
+          <a:bodyPr rtlCol="0" anchor="ctr"/>
+          <a:lstStyle/>
+          <a:p>
+            <a:pPr algn="ctr"/>
+            <a:r>
+              <a:rPr lang="en-US" dirty="0" smtClean="0"/>
+              <a:t>Match found</a:t>
+            </a:r>
+            <a:endParaRPr lang="en-US" dirty="0"/>
+          </a:p>
+        </p:txBody>
+      </p:sp>
+      <p:sp>
+        <p:nvSpPr>
+          <p:cNvPr id="9" name="Rectangle 8"/>
+          <p:cNvSpPr/>
+          <p:nvPr/>
+        </p:nvSpPr>
+        <p:spPr>
+          <a:xfrm>
+            <a:off x="10381489" y="5314354"/>
+            <a:ext cx="1481667" cy="829733"/>
+          </a:xfrm>
+          <a:prstGeom prst="rect">
+            <a:avLst/>
+          </a:prstGeom>
+        </p:spPr>
+        <p:style>
+          <a:lnRef idx="2">
+            <a:schemeClr val="accent1">
+              <a:shade val="50000"/>
+            </a:schemeClr>
+          </a:lnRef>
+          <a:fillRef idx="1">
+            <a:schemeClr val="accent1"/>
+          </a:fillRef>
+          <a:effectRef idx="0">
+            <a:schemeClr val="accent1"/>
+          </a:effectRef>
+          <a:fontRef idx="minor">
+            <a:schemeClr val="lt1"/>
+          </a:fontRef>
+        </p:style>
+        <p:txBody>
+          <a:bodyPr rtlCol="0" anchor="ctr"/>
+          <a:lstStyle/>
+          <a:p>
+            <a:pPr algn="ctr"/>
+            <a:r>
+              <a:rPr lang="en-US" dirty="0" smtClean="0"/>
+              <a:t>No match / Timeout</a:t>
+            </a:r>
+            <a:endParaRPr lang="en-US" dirty="0"/>
+          </a:p>
+        </p:txBody>
+      </p:sp>
+      <p:sp>
+        <p:nvSpPr>
+          <p:cNvPr id="10" name="Rectangle 9"/>
+          <p:cNvSpPr/>
+          <p:nvPr/>
+        </p:nvSpPr>
+        <p:spPr>
+          <a:xfrm>
+            <a:off x="8206196" y="971433"/>
+            <a:ext cx="1481667" cy="829733"/>
+          </a:xfrm>
+          <a:prstGeom prst="rect">
+            <a:avLst/>
+          </a:prstGeom>
+        </p:spPr>
+        <p:style>
+          <a:lnRef idx="2">
+            <a:schemeClr val="accent1">
+              <a:shade val="50000"/>
+            </a:schemeClr>
+          </a:lnRef>
+          <a:fillRef idx="1">
+            <a:schemeClr val="accent1"/>
+          </a:fillRef>
+          <a:effectRef idx="0">
+            <a:schemeClr val="accent1"/>
+          </a:effectRef>
+          <a:fontRef idx="minor">
+            <a:schemeClr val="lt1"/>
+          </a:fontRef>
+        </p:style>
+        <p:txBody>
+          <a:bodyPr rtlCol="0" anchor="ctr"/>
+          <a:lstStyle/>
+          <a:p>
+            <a:pPr algn="ctr"/>
+            <a:r>
+              <a:rPr lang="en-US" dirty="0" smtClean="0"/>
+              <a:t>Acquire delegate lock</a:t>
+            </a:r>
+            <a:endParaRPr lang="en-US" dirty="0"/>
+          </a:p>
+        </p:txBody>
+      </p:sp>
+      <p:cxnSp>
+        <p:nvCxnSpPr>
+          <p:cNvPr id="12" name="Straight Arrow Connector 11"/>
+          <p:cNvCxnSpPr>
+            <a:stCxn id="10" idx="2"/>
+            <a:endCxn id="4" idx="0"/>
+          </p:cNvCxnSpPr>
+          <p:nvPr/>
+        </p:nvCxnSpPr>
+        <p:spPr>
+          <a:xfrm flipH="1">
+            <a:off x="8102119" y="1801166"/>
+            <a:ext cx="844911" cy="578767"/>
+          </a:xfrm>
+          <a:prstGeom prst="straightConnector1">
+            <a:avLst/>
+          </a:prstGeom>
+          <a:ln w="19050">
+            <a:solidFill>
+              <a:schemeClr val="tx1"/>
+            </a:solidFill>
+            <a:tailEnd type="arrow"/>
+          </a:ln>
+        </p:spPr>
+        <p:style>
+          <a:lnRef idx="1">
+            <a:schemeClr val="accent1"/>
+          </a:lnRef>
+          <a:fillRef idx="0">
+            <a:schemeClr val="accent1"/>
+          </a:fillRef>
+          <a:effectRef idx="0">
+            <a:schemeClr val="accent1"/>
+          </a:effectRef>
+          <a:fontRef idx="minor">
+            <a:schemeClr val="tx1"/>
+          </a:fontRef>
+        </p:style>
+      </p:cxnSp>
+      <p:cxnSp>
+        <p:nvCxnSpPr>
+          <p:cNvPr id="16" name="Straight Arrow Connector 15"/>
+          <p:cNvCxnSpPr>
+            <a:stCxn id="5" idx="2"/>
+            <a:endCxn id="6" idx="0"/>
+          </p:cNvCxnSpPr>
+          <p:nvPr/>
+        </p:nvCxnSpPr>
+        <p:spPr>
+          <a:xfrm flipH="1">
+            <a:off x="8686556" y="3209666"/>
+            <a:ext cx="1229108" cy="673498"/>
+          </a:xfrm>
+          <a:prstGeom prst="straightConnector1">
+            <a:avLst/>
+          </a:prstGeom>
+          <a:ln w="19050">
+            <a:solidFill>
+              <a:schemeClr val="tx1"/>
+            </a:solidFill>
+            <a:tailEnd type="arrow"/>
+          </a:ln>
+        </p:spPr>
+        <p:style>
+          <a:lnRef idx="1">
+            <a:schemeClr val="accent1"/>
+          </a:lnRef>
+          <a:fillRef idx="0">
+            <a:schemeClr val="accent1"/>
+          </a:fillRef>
+          <a:effectRef idx="0">
+            <a:schemeClr val="accent1"/>
+          </a:effectRef>
+          <a:fontRef idx="minor">
+            <a:schemeClr val="tx1"/>
+          </a:fontRef>
+        </p:style>
+      </p:cxnSp>
+      <p:cxnSp>
+        <p:nvCxnSpPr>
+          <p:cNvPr id="18" name="Straight Arrow Connector 17"/>
+          <p:cNvCxnSpPr>
+            <a:stCxn id="5" idx="2"/>
+            <a:endCxn id="7" idx="0"/>
+          </p:cNvCxnSpPr>
+          <p:nvPr/>
+        </p:nvCxnSpPr>
+        <p:spPr>
+          <a:xfrm>
+            <a:off x="9915664" y="3209666"/>
+            <a:ext cx="513033" cy="673500"/>
+          </a:xfrm>
+          <a:prstGeom prst="straightConnector1">
+            <a:avLst/>
+          </a:prstGeom>
+          <a:ln w="19050">
+            <a:solidFill>
+              <a:schemeClr val="tx1"/>
+            </a:solidFill>
+            <a:tailEnd type="arrow"/>
+          </a:ln>
+        </p:spPr>
+        <p:style>
+          <a:lnRef idx="1">
+            <a:schemeClr val="accent1"/>
+          </a:lnRef>
+          <a:fillRef idx="0">
+            <a:schemeClr val="accent1"/>
+          </a:fillRef>
+          <a:effectRef idx="0">
+            <a:schemeClr val="accent1"/>
+          </a:effectRef>
+          <a:fontRef idx="minor">
+            <a:schemeClr val="tx1"/>
+          </a:fontRef>
+        </p:style>
+      </p:cxnSp>
+      <p:cxnSp>
+        <p:nvCxnSpPr>
+          <p:cNvPr id="22" name="Straight Arrow Connector 21"/>
+          <p:cNvCxnSpPr>
+            <a:stCxn id="7" idx="2"/>
+            <a:endCxn id="8" idx="0"/>
+          </p:cNvCxnSpPr>
+          <p:nvPr/>
+        </p:nvCxnSpPr>
+        <p:spPr>
+          <a:xfrm flipH="1">
+            <a:off x="9379308" y="4712899"/>
+            <a:ext cx="1049389" cy="601453"/>
+          </a:xfrm>
+          <a:prstGeom prst="straightConnector1">
+            <a:avLst/>
+          </a:prstGeom>
+          <a:ln w="19050">
+            <a:solidFill>
+              <a:schemeClr val="tx1"/>
+            </a:solidFill>
+            <a:tailEnd type="arrow"/>
+          </a:ln>
+        </p:spPr>
+        <p:style>
+          <a:lnRef idx="1">
+            <a:schemeClr val="accent1"/>
+          </a:lnRef>
+          <a:fillRef idx="0">
+            <a:schemeClr val="accent1"/>
+          </a:fillRef>
+          <a:effectRef idx="0">
+            <a:schemeClr val="accent1"/>
+          </a:effectRef>
+          <a:fontRef idx="minor">
+            <a:schemeClr val="tx1"/>
+          </a:fontRef>
+        </p:style>
+      </p:cxnSp>
+      <p:cxnSp>
+        <p:nvCxnSpPr>
+          <p:cNvPr id="24" name="Straight Arrow Connector 23"/>
+          <p:cNvCxnSpPr>
+            <a:stCxn id="7" idx="2"/>
+            <a:endCxn id="9" idx="0"/>
+          </p:cNvCxnSpPr>
+          <p:nvPr/>
+        </p:nvCxnSpPr>
+        <p:spPr>
+          <a:xfrm>
+            <a:off x="10428697" y="4712899"/>
+            <a:ext cx="693626" cy="601455"/>
+          </a:xfrm>
+          <a:prstGeom prst="straightConnector1">
+            <a:avLst/>
+          </a:prstGeom>
+          <a:ln w="19050">
+            <a:solidFill>
+              <a:schemeClr val="tx1"/>
+            </a:solidFill>
+            <a:tailEnd type="arrow"/>
+          </a:ln>
+        </p:spPr>
+        <p:style>
+          <a:lnRef idx="1">
+            <a:schemeClr val="accent1"/>
+          </a:lnRef>
+          <a:fillRef idx="0">
+            <a:schemeClr val="accent1"/>
+          </a:fillRef>
+          <a:effectRef idx="0">
+            <a:schemeClr val="accent1"/>
+          </a:effectRef>
+          <a:fontRef idx="minor">
+            <a:schemeClr val="tx1"/>
+          </a:fontRef>
+        </p:style>
+      </p:cxnSp>
+      <p:cxnSp>
+        <p:nvCxnSpPr>
+          <p:cNvPr id="26" name="Curved Connector 25"/>
+          <p:cNvCxnSpPr>
+            <a:stCxn id="9" idx="3"/>
+            <a:endCxn id="10" idx="3"/>
+          </p:cNvCxnSpPr>
+          <p:nvPr/>
+        </p:nvCxnSpPr>
+        <p:spPr>
+          <a:xfrm flipH="1" flipV="1">
+            <a:off x="9687863" y="1386300"/>
+            <a:ext cx="2175293" cy="4342921"/>
+          </a:xfrm>
+          <a:prstGeom prst="curvedConnector3">
+            <a:avLst>
+              <a:gd name="adj1" fmla="val -10509"/>
+            </a:avLst>
+          </a:prstGeom>
+          <a:ln w="19050">
+            <a:solidFill>
+              <a:schemeClr val="tx1"/>
+            </a:solidFill>
+            <a:tailEnd type="arrow"/>
+          </a:ln>
+        </p:spPr>
+        <p:style>
+          <a:lnRef idx="1">
+            <a:schemeClr val="accent1"/>
+          </a:lnRef>
+          <a:fillRef idx="0">
+            <a:schemeClr val="accent1"/>
+          </a:fillRef>
+          <a:effectRef idx="0">
+            <a:schemeClr val="accent1"/>
+          </a:effectRef>
+          <a:fontRef idx="minor">
+            <a:schemeClr val="tx1"/>
+          </a:fontRef>
+        </p:style>
+      </p:cxnSp>
+      <p:cxnSp>
+        <p:nvCxnSpPr>
+          <p:cNvPr id="40" name="Straight Arrow Connector 39"/>
+          <p:cNvCxnSpPr>
+            <a:stCxn id="10" idx="2"/>
+            <a:endCxn id="5" idx="0"/>
+          </p:cNvCxnSpPr>
+          <p:nvPr/>
+        </p:nvCxnSpPr>
+        <p:spPr>
+          <a:xfrm>
+            <a:off x="8947030" y="1801166"/>
+            <a:ext cx="968634" cy="578767"/>
+          </a:xfrm>
+          <a:prstGeom prst="straightConnector1">
+            <a:avLst/>
+          </a:prstGeom>
+          <a:ln w="19050">
+            <a:solidFill>
+              <a:schemeClr val="tx1"/>
+            </a:solidFill>
+            <a:tailEnd type="arrow"/>
+          </a:ln>
+        </p:spPr>
+        <p:style>
+          <a:lnRef idx="1">
+            <a:schemeClr val="accent1"/>
+          </a:lnRef>
+          <a:fillRef idx="0">
+            <a:schemeClr val="accent1"/>
+          </a:fillRef>
+          <a:effectRef idx="0">
+            <a:schemeClr val="accent1"/>
+          </a:effectRef>
+          <a:fontRef idx="minor">
+            <a:schemeClr val="tx1"/>
+          </a:fontRef>
+        </p:style>
+      </p:cxnSp>
     </p:spTree>
     <p:extLst>
       <p:ext uri="{BB962C8B-B14F-4D97-AF65-F5344CB8AC3E}">
-        <p14:creationId xmlns:p14="http://schemas.microsoft.com/office/powerpoint/2010/main" val="1044984339"/>
+        <p14:creationId xmlns:p14="http://schemas.microsoft.com/office/powerpoint/2010/main" val="1669618788"/>
       </p:ext>
     </p:extLst>
   </p:cSld>
@@ -4567,40 +6148,96 @@
           <a:p>
             <a:r>
               <a:rPr lang="en-US" dirty="0" smtClean="0"/>
-              <a:t>Results</a:t>
+              <a:t>Implementation</a:t>
             </a:r>
             <a:endParaRPr lang="en-US" dirty="0"/>
           </a:p>
         </p:txBody>
       </p:sp>
-      <p:pic>
-        <p:nvPicPr>
-          <p:cNvPr id="4" name="Picture 3"/>
-          <p:cNvPicPr>
-            <a:picLocks noChangeAspect="1"/>
-          </p:cNvPicPr>
-          <p:nvPr/>
-        </p:nvPicPr>
-        <p:blipFill>
-          <a:blip r:embed="rId2"/>
-          <a:stretch>
-            <a:fillRect/>
-          </a:stretch>
-        </p:blipFill>
+      <p:sp>
+        <p:nvSpPr>
+          <p:cNvPr id="3" name="Content Placeholder 2"/>
+          <p:cNvSpPr>
+            <a:spLocks noGrp="1"/>
+          </p:cNvSpPr>
+          <p:nvPr>
+            <p:ph idx="1"/>
+          </p:nvPr>
+        </p:nvSpPr>
         <p:spPr>
           <a:xfrm>
-            <a:off x="2095332" y="1320743"/>
-            <a:ext cx="8001336" cy="5537257"/>
+            <a:off x="838200" y="1794933"/>
+            <a:ext cx="10515600" cy="4799050"/>
           </a:xfrm>
-          <a:prstGeom prst="rect">
-            <a:avLst/>
-          </a:prstGeom>
         </p:spPr>
-      </p:pic>
+        <p:txBody>
+          <a:bodyPr>
+            <a:normAutofit/>
+          </a:bodyPr>
+          <a:lstStyle/>
+          <a:p>
+            <a:r>
+              <a:rPr lang="en-US" sz="3600" dirty="0" smtClean="0"/>
+              <a:t>Elimination</a:t>
+            </a:r>
+          </a:p>
+          <a:p>
+            <a:pPr lvl="1"/>
+            <a:r>
+              <a:rPr lang="en-US" sz="3200" dirty="0" smtClean="0"/>
+              <a:t>Exchanger </a:t>
+            </a:r>
+            <a:r>
+              <a:rPr lang="en-US" sz="3200" dirty="0" smtClean="0"/>
+              <a:t>has four states:</a:t>
+            </a:r>
+          </a:p>
+          <a:p>
+            <a:pPr lvl="2"/>
+            <a:r>
+              <a:rPr lang="en-US" sz="2800" dirty="0" smtClean="0"/>
+              <a:t>EMPTY, PUSH_WAIT, POP_WAIT, BUSY</a:t>
+            </a:r>
+          </a:p>
+          <a:p>
+            <a:pPr lvl="2"/>
+            <a:r>
+              <a:rPr lang="en-US" sz="2800" dirty="0" smtClean="0"/>
+              <a:t>Helps prevent false matches</a:t>
+            </a:r>
+          </a:p>
+          <a:p>
+            <a:pPr lvl="1"/>
+            <a:r>
+              <a:rPr lang="en-US" sz="3200" dirty="0" smtClean="0"/>
+              <a:t>Important </a:t>
+            </a:r>
+            <a:r>
+              <a:rPr lang="en-US" sz="3200" dirty="0" smtClean="0"/>
+              <a:t>attributes affecting the performance:</a:t>
+            </a:r>
+          </a:p>
+          <a:p>
+            <a:pPr lvl="2"/>
+            <a:r>
+              <a:rPr lang="en-US" sz="2800" dirty="0" smtClean="0"/>
+              <a:t>Array length</a:t>
+            </a:r>
+          </a:p>
+          <a:p>
+            <a:pPr lvl="2"/>
+            <a:r>
+              <a:rPr lang="en-US" sz="2800" dirty="0" smtClean="0"/>
+              <a:t>Range policy</a:t>
+            </a:r>
+            <a:endParaRPr lang="en-US" sz="2800" dirty="0"/>
+          </a:p>
+        </p:txBody>
+      </p:sp>
     </p:spTree>
     <p:extLst>
       <p:ext uri="{BB962C8B-B14F-4D97-AF65-F5344CB8AC3E}">
-        <p14:creationId xmlns:p14="http://schemas.microsoft.com/office/powerpoint/2010/main" val="3482677248"/>
+        <p14:creationId xmlns:p14="http://schemas.microsoft.com/office/powerpoint/2010/main" val="2992746129"/>
       </p:ext>
     </p:extLst>
   </p:cSld>
@@ -4865,7 +6502,7 @@
   <a:extraClrSchemeLst/>
   <a:extLst>
     <a:ext uri="{05A4C25C-085E-4340-85A3-A5531E510DB2}">
-      <thm15:themeFamily xmlns:thm15="http://schemas.microsoft.com/office/thememl/2012/main" name="Office Theme" id="{62F939B6-93AF-4DB8-9C6B-D6C7DFDC589F}" vid="{4A3C46E8-61CC-4603-A589-7422A47A8E4A}"/>
+      <thm15:themeFamily xmlns:thm15="http://schemas.microsoft.com/office/thememl/2012/main" xmlns="" name="Office Theme" id="{62F939B6-93AF-4DB8-9C6B-D6C7DFDC589F}" vid="{4A3C46E8-61CC-4603-A589-7422A47A8E4A}"/>
     </a:ext>
   </a:extLst>
 </a:theme>

</xml_diff>